<commit_message>
micro 2 powerpoint update.
</commit_message>
<xml_diff>
--- a/class/micro02.pptx
+++ b/class/micro02.pptx
@@ -7,24 +7,26 @@
   <p:sldIdLst>
     <p:sldId id="256" r:id="rId2"/>
     <p:sldId id="272" r:id="rId3"/>
-    <p:sldId id="274" r:id="rId4"/>
-    <p:sldId id="275" r:id="rId5"/>
-    <p:sldId id="276" r:id="rId6"/>
-    <p:sldId id="277" r:id="rId7"/>
-    <p:sldId id="279" r:id="rId8"/>
-    <p:sldId id="273" r:id="rId9"/>
-    <p:sldId id="278" r:id="rId10"/>
-    <p:sldId id="280" r:id="rId11"/>
-    <p:sldId id="281" r:id="rId12"/>
-    <p:sldId id="282" r:id="rId13"/>
-    <p:sldId id="283" r:id="rId14"/>
-    <p:sldId id="288" r:id="rId15"/>
-    <p:sldId id="286" r:id="rId16"/>
-    <p:sldId id="289" r:id="rId17"/>
-    <p:sldId id="284" r:id="rId18"/>
-    <p:sldId id="290" r:id="rId19"/>
-    <p:sldId id="285" r:id="rId20"/>
-    <p:sldId id="287" r:id="rId21"/>
+    <p:sldId id="293" r:id="rId4"/>
+    <p:sldId id="274" r:id="rId5"/>
+    <p:sldId id="275" r:id="rId6"/>
+    <p:sldId id="276" r:id="rId7"/>
+    <p:sldId id="277" r:id="rId8"/>
+    <p:sldId id="279" r:id="rId9"/>
+    <p:sldId id="273" r:id="rId10"/>
+    <p:sldId id="278" r:id="rId11"/>
+    <p:sldId id="280" r:id="rId12"/>
+    <p:sldId id="281" r:id="rId13"/>
+    <p:sldId id="282" r:id="rId14"/>
+    <p:sldId id="283" r:id="rId15"/>
+    <p:sldId id="288" r:id="rId16"/>
+    <p:sldId id="286" r:id="rId17"/>
+    <p:sldId id="289" r:id="rId18"/>
+    <p:sldId id="284" r:id="rId19"/>
+    <p:sldId id="291" r:id="rId20"/>
+    <p:sldId id="285" r:id="rId21"/>
+    <p:sldId id="292" r:id="rId22"/>
+    <p:sldId id="287" r:id="rId23"/>
   </p:sldIdLst>
   <p:sldSz cx="12192000" cy="6858000"/>
   <p:notesSz cx="6858000" cy="9144000"/>
@@ -5909,11 +5911,40 @@
               <a:rPr lang="en-US" dirty="0">
                 <a:cs typeface="B Titr" panose="00000700000000000000" pitchFamily="2" charset="-78"/>
               </a:rPr>
-              <a:t>Serial Peripheral Interface</a:t>
-            </a:r>
-          </a:p>
-        </p:txBody>
-      </p:sp>
+              <a:t>Universal Asynchronous Receiver / Transmitter</a:t>
+            </a:r>
+          </a:p>
+        </p:txBody>
+      </p:sp>
+      <p:pic>
+        <p:nvPicPr>
+          <p:cNvPr id="5" name="Content Placeholder 4">
+            <a:extLst>
+              <a:ext uri="{FF2B5EF4-FFF2-40B4-BE49-F238E27FC236}">
+                <a16:creationId xmlns:a16="http://schemas.microsoft.com/office/drawing/2014/main" id="{76A2BC28-FDE9-9B61-EB77-4B39D5A14B7F}"/>
+              </a:ext>
+            </a:extLst>
+          </p:cNvPr>
+          <p:cNvPicPr>
+            <a:picLocks noGrp="1" noChangeAspect="1"/>
+          </p:cNvPicPr>
+          <p:nvPr>
+            <p:ph idx="1"/>
+          </p:nvPr>
+        </p:nvPicPr>
+        <p:blipFill>
+          <a:blip r:embed="rId2"/>
+          <a:stretch>
+            <a:fillRect/>
+          </a:stretch>
+        </p:blipFill>
+        <p:spPr>
+          <a:xfrm>
+            <a:off x="-62753" y="2894993"/>
+            <a:ext cx="6096000" cy="3429000"/>
+          </a:xfrm>
+        </p:spPr>
+      </p:pic>
       <p:sp>
         <p:nvSpPr>
           <p:cNvPr id="6" name="Content Placeholder 2">
@@ -6106,6 +6137,296 @@
             </a:lvl9pPr>
           </a:lstStyle>
           <a:p>
+            <a:pPr algn="r" rtl="1"/>
+            <a:r>
+              <a:rPr lang="en-US" dirty="0">
+                <a:cs typeface="B Yekan" panose="00000400000000000000" pitchFamily="2" charset="-78"/>
+              </a:rPr>
+              <a:t>RS232</a:t>
+            </a:r>
+          </a:p>
+          <a:p>
+            <a:pPr algn="r" rtl="1"/>
+            <a:r>
+              <a:rPr lang="en-US" dirty="0">
+                <a:cs typeface="B Yekan" panose="00000400000000000000" pitchFamily="2" charset="-78"/>
+              </a:rPr>
+              <a:t>Baud Rate:</a:t>
+            </a:r>
+            <a:r>
+              <a:rPr lang="en-US" b="0" i="0" dirty="0">
+                <a:effectLst/>
+                <a:latin typeface="Linotype Univers"/>
+              </a:rPr>
+              <a:t>4800, 9600, 19.2K, 57.6K,115.2K</a:t>
+            </a:r>
+          </a:p>
+          <a:p>
+            <a:pPr algn="r" rtl="1"/>
+            <a:endParaRPr lang="en-US" dirty="0">
+              <a:cs typeface="B Yekan" panose="00000400000000000000" pitchFamily="2" charset="-78"/>
+            </a:endParaRPr>
+          </a:p>
+          <a:p>
+            <a:pPr algn="r" rtl="1"/>
+            <a:endParaRPr lang="en-US" dirty="0">
+              <a:cs typeface="B Yekan" panose="00000400000000000000" pitchFamily="2" charset="-78"/>
+            </a:endParaRPr>
+          </a:p>
+        </p:txBody>
+      </p:sp>
+    </p:spTree>
+    <p:extLst>
+      <p:ext uri="{BB962C8B-B14F-4D97-AF65-F5344CB8AC3E}">
+        <p14:creationId xmlns:p14="http://schemas.microsoft.com/office/powerpoint/2010/main" val="96513302"/>
+      </p:ext>
+    </p:extLst>
+  </p:cSld>
+  <p:clrMapOvr>
+    <a:masterClrMapping/>
+  </p:clrMapOvr>
+</p:sld>
+</file>
+
+<file path=ppt/slides/slide11.xml><?xml version="1.0" encoding="utf-8"?>
+<p:sld xmlns:a="http://schemas.openxmlformats.org/drawingml/2006/main" xmlns:r="http://schemas.openxmlformats.org/officeDocument/2006/relationships" xmlns:p="http://schemas.openxmlformats.org/presentationml/2006/main">
+  <p:cSld>
+    <p:spTree>
+      <p:nvGrpSpPr>
+        <p:cNvPr id="1" name=""/>
+        <p:cNvGrpSpPr/>
+        <p:nvPr/>
+      </p:nvGrpSpPr>
+      <p:grpSpPr>
+        <a:xfrm>
+          <a:off x="0" y="0"/>
+          <a:ext cx="0" cy="0"/>
+          <a:chOff x="0" y="0"/>
+          <a:chExt cx="0" cy="0"/>
+        </a:xfrm>
+      </p:grpSpPr>
+      <p:sp>
+        <p:nvSpPr>
+          <p:cNvPr id="2" name="Title 1">
+            <a:extLst>
+              <a:ext uri="{FF2B5EF4-FFF2-40B4-BE49-F238E27FC236}">
+                <a16:creationId xmlns:a16="http://schemas.microsoft.com/office/drawing/2014/main" id="{856C7422-8099-6D5D-6DE3-FC740C14487C}"/>
+              </a:ext>
+            </a:extLst>
+          </p:cNvPr>
+          <p:cNvSpPr>
+            <a:spLocks noGrp="1"/>
+          </p:cNvSpPr>
+          <p:nvPr>
+            <p:ph type="title"/>
+          </p:nvPr>
+        </p:nvSpPr>
+        <p:spPr/>
+        <p:txBody>
+          <a:bodyPr/>
+          <a:lstStyle/>
+          <a:p>
+            <a:r>
+              <a:rPr lang="en-US" dirty="0">
+                <a:cs typeface="B Titr" panose="00000700000000000000" pitchFamily="2" charset="-78"/>
+              </a:rPr>
+              <a:t>Serial Peripheral Interface</a:t>
+            </a:r>
+          </a:p>
+        </p:txBody>
+      </p:sp>
+      <p:sp>
+        <p:nvSpPr>
+          <p:cNvPr id="6" name="Content Placeholder 2">
+            <a:extLst>
+              <a:ext uri="{FF2B5EF4-FFF2-40B4-BE49-F238E27FC236}">
+                <a16:creationId xmlns:a16="http://schemas.microsoft.com/office/drawing/2014/main" id="{24E3D5CD-64F9-862A-E710-6B80AB70EA48}"/>
+              </a:ext>
+            </a:extLst>
+          </p:cNvPr>
+          <p:cNvSpPr txBox="1">
+            <a:spLocks/>
+          </p:cNvSpPr>
+          <p:nvPr/>
+        </p:nvSpPr>
+        <p:spPr>
+          <a:xfrm>
+            <a:off x="685800" y="2194560"/>
+            <a:ext cx="10820400" cy="4024125"/>
+          </a:xfrm>
+          <a:prstGeom prst="rect">
+            <a:avLst/>
+          </a:prstGeom>
+        </p:spPr>
+        <p:txBody>
+          <a:bodyPr vert="horz" lIns="91440" tIns="45720" rIns="91440" bIns="45720" rtlCol="0">
+            <a:normAutofit/>
+          </a:bodyPr>
+          <a:lstStyle>
+            <a:lvl1pPr marL="228600" indent="-228600" algn="l" defTabSz="914400" rtl="0" eaLnBrk="1" latinLnBrk="0" hangingPunct="1">
+              <a:lnSpc>
+                <a:spcPct val="90000"/>
+              </a:lnSpc>
+              <a:spcBef>
+                <a:spcPts val="1000"/>
+              </a:spcBef>
+              <a:buFont typeface="Arial" panose="020B0604020202020204" pitchFamily="34" charset="0"/>
+              <a:buChar char="•"/>
+              <a:defRPr sz="2200" kern="1200">
+                <a:solidFill>
+                  <a:schemeClr val="tx1"/>
+                </a:solidFill>
+                <a:latin typeface="+mn-lt"/>
+                <a:ea typeface="+mn-ea"/>
+                <a:cs typeface="+mn-cs"/>
+              </a:defRPr>
+            </a:lvl1pPr>
+            <a:lvl2pPr marL="685800" indent="-228600" algn="l" defTabSz="914400" rtl="0" eaLnBrk="1" latinLnBrk="0" hangingPunct="1">
+              <a:lnSpc>
+                <a:spcPct val="90000"/>
+              </a:lnSpc>
+              <a:spcBef>
+                <a:spcPts val="500"/>
+              </a:spcBef>
+              <a:buFont typeface="Arial" panose="020B0604020202020204" pitchFamily="34" charset="0"/>
+              <a:buChar char="•"/>
+              <a:defRPr sz="2000" kern="1200">
+                <a:solidFill>
+                  <a:schemeClr val="tx1"/>
+                </a:solidFill>
+                <a:latin typeface="+mn-lt"/>
+                <a:ea typeface="+mn-ea"/>
+                <a:cs typeface="+mn-cs"/>
+              </a:defRPr>
+            </a:lvl2pPr>
+            <a:lvl3pPr marL="1143000" indent="-228600" algn="l" defTabSz="914400" rtl="0" eaLnBrk="1" latinLnBrk="0" hangingPunct="1">
+              <a:lnSpc>
+                <a:spcPct val="90000"/>
+              </a:lnSpc>
+              <a:spcBef>
+                <a:spcPts val="500"/>
+              </a:spcBef>
+              <a:buFont typeface="Arial" panose="020B0604020202020204" pitchFamily="34" charset="0"/>
+              <a:buChar char="•"/>
+              <a:defRPr sz="1800" kern="1200">
+                <a:solidFill>
+                  <a:schemeClr val="tx1"/>
+                </a:solidFill>
+                <a:latin typeface="+mn-lt"/>
+                <a:ea typeface="+mn-ea"/>
+                <a:cs typeface="+mn-cs"/>
+              </a:defRPr>
+            </a:lvl3pPr>
+            <a:lvl4pPr marL="1600200" indent="-228600" algn="l" defTabSz="914400" rtl="0" eaLnBrk="1" latinLnBrk="0" hangingPunct="1">
+              <a:lnSpc>
+                <a:spcPct val="90000"/>
+              </a:lnSpc>
+              <a:spcBef>
+                <a:spcPts val="500"/>
+              </a:spcBef>
+              <a:buFont typeface="Arial" panose="020B0604020202020204" pitchFamily="34" charset="0"/>
+              <a:buChar char="•"/>
+              <a:defRPr sz="1600" kern="1200">
+                <a:solidFill>
+                  <a:schemeClr val="tx1"/>
+                </a:solidFill>
+                <a:latin typeface="+mn-lt"/>
+                <a:ea typeface="+mn-ea"/>
+                <a:cs typeface="+mn-cs"/>
+              </a:defRPr>
+            </a:lvl4pPr>
+            <a:lvl5pPr marL="2057400" indent="-228600" algn="l" defTabSz="914400" rtl="0" eaLnBrk="1" latinLnBrk="0" hangingPunct="1">
+              <a:lnSpc>
+                <a:spcPct val="90000"/>
+              </a:lnSpc>
+              <a:spcBef>
+                <a:spcPts val="500"/>
+              </a:spcBef>
+              <a:buFont typeface="Arial" panose="020B0604020202020204" pitchFamily="34" charset="0"/>
+              <a:buChar char="•"/>
+              <a:defRPr sz="1600" kern="1200">
+                <a:solidFill>
+                  <a:schemeClr val="tx1"/>
+                </a:solidFill>
+                <a:latin typeface="+mn-lt"/>
+                <a:ea typeface="+mn-ea"/>
+                <a:cs typeface="+mn-cs"/>
+              </a:defRPr>
+            </a:lvl5pPr>
+            <a:lvl6pPr marL="2514600" indent="-228600" algn="l" defTabSz="914400" rtl="0" eaLnBrk="1" latinLnBrk="0" hangingPunct="1">
+              <a:lnSpc>
+                <a:spcPct val="90000"/>
+              </a:lnSpc>
+              <a:spcBef>
+                <a:spcPts val="500"/>
+              </a:spcBef>
+              <a:buFont typeface="Arial" panose="020B0604020202020204" pitchFamily="34" charset="0"/>
+              <a:buChar char="•"/>
+              <a:defRPr sz="1600" kern="1200">
+                <a:solidFill>
+                  <a:schemeClr val="tx1"/>
+                </a:solidFill>
+                <a:latin typeface="+mn-lt"/>
+                <a:ea typeface="+mn-ea"/>
+                <a:cs typeface="+mn-cs"/>
+              </a:defRPr>
+            </a:lvl6pPr>
+            <a:lvl7pPr marL="2971800" indent="-228600" algn="l" defTabSz="914400" rtl="0" eaLnBrk="1" latinLnBrk="0" hangingPunct="1">
+              <a:lnSpc>
+                <a:spcPct val="90000"/>
+              </a:lnSpc>
+              <a:spcBef>
+                <a:spcPts val="500"/>
+              </a:spcBef>
+              <a:buFont typeface="Arial" panose="020B0604020202020204" pitchFamily="34" charset="0"/>
+              <a:buChar char="•"/>
+              <a:defRPr sz="1600" kern="1200">
+                <a:solidFill>
+                  <a:schemeClr val="tx1"/>
+                </a:solidFill>
+                <a:latin typeface="+mn-lt"/>
+                <a:ea typeface="+mn-ea"/>
+                <a:cs typeface="+mn-cs"/>
+              </a:defRPr>
+            </a:lvl7pPr>
+            <a:lvl8pPr marL="3429000" indent="-228600" algn="l" defTabSz="914400" rtl="0" eaLnBrk="1" latinLnBrk="0" hangingPunct="1">
+              <a:lnSpc>
+                <a:spcPct val="90000"/>
+              </a:lnSpc>
+              <a:spcBef>
+                <a:spcPts val="500"/>
+              </a:spcBef>
+              <a:buFont typeface="Arial" panose="020B0604020202020204" pitchFamily="34" charset="0"/>
+              <a:buChar char="•"/>
+              <a:defRPr sz="1600" kern="1200">
+                <a:solidFill>
+                  <a:schemeClr val="tx1"/>
+                </a:solidFill>
+                <a:latin typeface="+mn-lt"/>
+                <a:ea typeface="+mn-ea"/>
+                <a:cs typeface="+mn-cs"/>
+              </a:defRPr>
+            </a:lvl8pPr>
+            <a:lvl9pPr marL="3886200" indent="-228600" algn="l" defTabSz="914400" rtl="0" eaLnBrk="1" latinLnBrk="0" hangingPunct="1">
+              <a:lnSpc>
+                <a:spcPct val="90000"/>
+              </a:lnSpc>
+              <a:spcBef>
+                <a:spcPts val="500"/>
+              </a:spcBef>
+              <a:buFont typeface="Arial" panose="020B0604020202020204" pitchFamily="34" charset="0"/>
+              <a:buChar char="•"/>
+              <a:defRPr sz="1600" kern="1200">
+                <a:solidFill>
+                  <a:schemeClr val="tx1"/>
+                </a:solidFill>
+                <a:latin typeface="+mn-lt"/>
+                <a:ea typeface="+mn-ea"/>
+                <a:cs typeface="+mn-cs"/>
+              </a:defRPr>
+            </a:lvl9pPr>
+          </a:lstStyle>
+          <a:p>
             <a:pPr marL="0" indent="0" algn="r" rtl="1">
               <a:buNone/>
             </a:pPr>
@@ -6152,7 +6473,7 @@
 </p:sld>
 </file>
 
-<file path=ppt/slides/slide11.xml><?xml version="1.0" encoding="utf-8"?>
+<file path=ppt/slides/slide12.xml><?xml version="1.0" encoding="utf-8"?>
 <p:sld xmlns:a="http://schemas.openxmlformats.org/drawingml/2006/main" xmlns:r="http://schemas.openxmlformats.org/officeDocument/2006/relationships" xmlns:p="http://schemas.openxmlformats.org/presentationml/2006/main">
   <p:cSld>
     <p:spTree>
@@ -6480,7 +6801,7 @@
 </p:sld>
 </file>
 
-<file path=ppt/slides/slide12.xml><?xml version="1.0" encoding="utf-8"?>
+<file path=ppt/slides/slide13.xml><?xml version="1.0" encoding="utf-8"?>
 <p:sld xmlns:a="http://schemas.openxmlformats.org/drawingml/2006/main" xmlns:r="http://schemas.openxmlformats.org/officeDocument/2006/relationships" xmlns:p="http://schemas.openxmlformats.org/presentationml/2006/main">
   <p:cSld>
     <p:spTree>
@@ -6583,7 +6904,7 @@
 </p:sld>
 </file>
 
-<file path=ppt/slides/slide13.xml><?xml version="1.0" encoding="utf-8"?>
+<file path=ppt/slides/slide14.xml><?xml version="1.0" encoding="utf-8"?>
 <p:sld xmlns:a="http://schemas.openxmlformats.org/drawingml/2006/main" xmlns:r="http://schemas.openxmlformats.org/officeDocument/2006/relationships" xmlns:p="http://schemas.openxmlformats.org/presentationml/2006/main">
   <p:cSld>
     <p:spTree>
@@ -6906,7 +7227,7 @@
 </p:sld>
 </file>
 
-<file path=ppt/slides/slide14.xml><?xml version="1.0" encoding="utf-8"?>
+<file path=ppt/slides/slide15.xml><?xml version="1.0" encoding="utf-8"?>
 <p:sld xmlns:a="http://schemas.openxmlformats.org/drawingml/2006/main" xmlns:r="http://schemas.openxmlformats.org/officeDocument/2006/relationships" xmlns:p="http://schemas.openxmlformats.org/presentationml/2006/main">
   <p:cSld>
     <p:spTree>
@@ -6996,8 +7317,8 @@
         </p:blipFill>
         <p:spPr>
           <a:xfrm>
-            <a:off x="525705" y="2373107"/>
-            <a:ext cx="4991175" cy="3346974"/>
+            <a:off x="525705" y="2373106"/>
+            <a:ext cx="5976695" cy="3804173"/>
           </a:xfrm>
           <a:prstGeom prst="roundRect">
             <a:avLst>
@@ -7031,8 +7352,8 @@
         </p:nvSpPr>
         <p:spPr>
           <a:xfrm>
-            <a:off x="6014338" y="2348454"/>
-            <a:ext cx="6594821" cy="2031325"/>
+            <a:off x="7111619" y="2511014"/>
+            <a:ext cx="4877182" cy="2031325"/>
           </a:xfrm>
           <a:prstGeom prst="rect">
             <a:avLst/>
@@ -7081,15 +7402,17 @@
           </a:p>
           <a:p>
             <a:r>
-              <a:rPr lang="en-US" b="0" i="0">
+              <a:rPr lang="en-US" b="0" i="0" dirty="0">
                 <a:solidFill>
                   <a:srgbClr val="CCCCCC"/>
                 </a:solidFill>
                 <a:effectLst/>
                 <a:latin typeface="Helvetica Neue"/>
               </a:rPr>
-              <a:t>Erasable </a:t>
-            </a:r>
+              <a:t>Erasable Programmable ROM</a:t>
+            </a:r>
+          </a:p>
+          <a:p>
             <a:r>
               <a:rPr lang="en-US" b="0" i="0" dirty="0">
                 <a:solidFill>
@@ -7098,7 +7421,7 @@
                 <a:effectLst/>
                 <a:latin typeface="Helvetica Neue"/>
               </a:rPr>
-              <a:t>Programmable ROM</a:t>
+              <a:t>Ultra Violet Read Only Memory</a:t>
             </a:r>
           </a:p>
           <a:p>
@@ -7110,19 +7433,7 @@
                 <a:effectLst/>
                 <a:latin typeface="Helvetica Neue"/>
               </a:rPr>
-              <a:t>Ultra Violet Read Only Memory</a:t>
-            </a:r>
-          </a:p>
-          <a:p>
-            <a:r>
-              <a:rPr lang="en-US" b="0" i="0" dirty="0">
-                <a:solidFill>
-                  <a:srgbClr val="CCCCCC"/>
-                </a:solidFill>
-                <a:effectLst/>
-                <a:latin typeface="Helvetica Neue"/>
-              </a:rPr>
-              <a:t>Electronically Erasable Programmable Read-Only Memory</a:t>
+              <a:t>Electronically Erasable Programmable ROM</a:t>
             </a:r>
           </a:p>
           <a:p>
@@ -7143,7 +7454,7 @@
 </p:sld>
 </file>
 
-<file path=ppt/slides/slide15.xml><?xml version="1.0" encoding="utf-8"?>
+<file path=ppt/slides/slide16.xml><?xml version="1.0" encoding="utf-8"?>
 <p:sld xmlns:a="http://schemas.openxmlformats.org/drawingml/2006/main" xmlns:r="http://schemas.openxmlformats.org/officeDocument/2006/relationships" xmlns:p="http://schemas.openxmlformats.org/presentationml/2006/main">
   <p:cSld>
     <p:spTree>
@@ -7751,7 +8062,7 @@
 </p:sld>
 </file>
 
-<file path=ppt/slides/slide16.xml><?xml version="1.0" encoding="utf-8"?>
+<file path=ppt/slides/slide17.xml><?xml version="1.0" encoding="utf-8"?>
 <p:sld xmlns:a="http://schemas.openxmlformats.org/drawingml/2006/main" xmlns:r="http://schemas.openxmlformats.org/officeDocument/2006/relationships" xmlns:p="http://schemas.openxmlformats.org/presentationml/2006/main">
   <p:cSld>
     <p:spTree>
@@ -8056,7 +8367,7 @@
 </p:sld>
 </file>
 
-<file path=ppt/slides/slide17.xml><?xml version="1.0" encoding="utf-8"?>
+<file path=ppt/slides/slide18.xml><?xml version="1.0" encoding="utf-8"?>
 <p:sld xmlns:a="http://schemas.openxmlformats.org/drawingml/2006/main" xmlns:r="http://schemas.openxmlformats.org/officeDocument/2006/relationships" xmlns:p="http://schemas.openxmlformats.org/presentationml/2006/main">
   <p:cSld>
     <p:spTree>
@@ -8425,7 +8736,7 @@
 </p:sld>
 </file>
 
-<file path=ppt/slides/slide18.xml><?xml version="1.0" encoding="utf-8"?>
+<file path=ppt/slides/slide19.xml><?xml version="1.0" encoding="utf-8"?>
 <p:sld xmlns:a="http://schemas.openxmlformats.org/drawingml/2006/main" xmlns:r="http://schemas.openxmlformats.org/officeDocument/2006/relationships" xmlns:p="http://schemas.openxmlformats.org/presentationml/2006/main">
   <p:cSld>
     <p:spTree>
@@ -8461,40 +8772,23 @@
         <p:spPr/>
         <p:txBody>
           <a:bodyPr>
-            <a:normAutofit fontScale="90000"/>
+            <a:normAutofit/>
           </a:bodyPr>
           <a:lstStyle/>
           <a:p>
+            <a:pPr rtl="1"/>
+            <a:r>
+              <a:rPr lang="fa-IR" dirty="0">
+                <a:cs typeface="B Titr" panose="00000700000000000000" pitchFamily="2" charset="-78"/>
+              </a:rPr>
+              <a:t>نمونه برنامه به </a:t>
+            </a:r>
             <a:r>
               <a:rPr lang="en-US" dirty="0">
                 <a:cs typeface="B Titr" panose="00000700000000000000" pitchFamily="2" charset="-78"/>
               </a:rPr>
               <a:t>BASIC</a:t>
             </a:r>
-            <a:r>
-              <a:rPr lang="en-US" b="0" i="0" dirty="0">
-                <a:effectLst/>
-                <a:latin typeface="Arial" panose="020B0604020202020204" pitchFamily="34" charset="0"/>
-              </a:rPr>
-              <a:t> (</a:t>
-            </a:r>
-            <a:r>
-              <a:rPr lang="en-US" b="1" i="0" dirty="0">
-                <a:effectLst/>
-                <a:latin typeface="Arial" panose="020B0604020202020204" pitchFamily="34" charset="0"/>
-              </a:rPr>
-              <a:t>Beginners' All-purpose Symbolic Instruction Code</a:t>
-            </a:r>
-            <a:r>
-              <a:rPr lang="en-US" b="0" i="0" dirty="0">
-                <a:effectLst/>
-                <a:latin typeface="Arial" panose="020B0604020202020204" pitchFamily="34" charset="0"/>
-              </a:rPr>
-              <a:t>)</a:t>
-            </a:r>
-            <a:endParaRPr lang="en-US" dirty="0">
-              <a:cs typeface="B Titr" panose="00000700000000000000" pitchFamily="2" charset="-78"/>
-            </a:endParaRPr>
           </a:p>
         </p:txBody>
       </p:sp>
@@ -8690,71 +8984,47 @@
             </a:lvl9pPr>
           </a:lstStyle>
           <a:p>
-            <a:pPr algn="r" rtl="1"/>
+            <a:pPr algn="l"/>
             <a:r>
               <a:rPr lang="en-US" dirty="0">
                 <a:cs typeface="B Yekan" panose="00000400000000000000" pitchFamily="2" charset="-78"/>
               </a:rPr>
-              <a:t>High Level </a:t>
-            </a:r>
-          </a:p>
-          <a:p>
-            <a:pPr algn="r" rtl="1"/>
-            <a:r>
-              <a:rPr lang="fa-IR" dirty="0">
+              <a:t>10 CLS</a:t>
+            </a:r>
+          </a:p>
+          <a:p>
+            <a:pPr algn="l"/>
+            <a:r>
+              <a:rPr lang="en-US" dirty="0">
                 <a:cs typeface="B Yekan" panose="00000400000000000000" pitchFamily="2" charset="-78"/>
               </a:rPr>
-              <a:t>استفاده آسان برای همه</a:t>
-            </a:r>
-          </a:p>
-          <a:p>
-            <a:pPr algn="r" rtl="1"/>
-            <a:r>
-              <a:rPr lang="fa-IR" dirty="0">
+              <a:t>20 INPUT " Enter Your Name ", X</a:t>
+            </a:r>
+          </a:p>
+          <a:p>
+            <a:pPr algn="l"/>
+            <a:r>
+              <a:rPr lang="en-US" dirty="0">
                 <a:cs typeface="B Yekan" panose="00000400000000000000" pitchFamily="2" charset="-78"/>
               </a:rPr>
-              <a:t>یک زبان برنامه نویسی همه منظوره</a:t>
-            </a:r>
-          </a:p>
-          <a:p>
-            <a:pPr algn="r" rtl="1"/>
-            <a:r>
-              <a:rPr lang="fa-IR" dirty="0">
+              <a:t>30 PRINT X = " YOUR NAME"</a:t>
+            </a:r>
+          </a:p>
+          <a:p>
+            <a:pPr algn="l"/>
+            <a:r>
+              <a:rPr lang="en-US" dirty="0">
                 <a:cs typeface="B Yekan" panose="00000400000000000000" pitchFamily="2" charset="-78"/>
               </a:rPr>
-              <a:t>برای برنامه های کوچک قابل استفاده باشد</a:t>
-            </a:r>
-          </a:p>
-          <a:p>
-            <a:pPr algn="r" rtl="1"/>
-            <a:r>
-              <a:rPr lang="fa-IR" dirty="0">
-                <a:cs typeface="B Yekan" panose="00000400000000000000" pitchFamily="2" charset="-78"/>
-              </a:rPr>
-              <a:t>نیازی به شناخت سخت افزار نباشد</a:t>
-            </a:r>
-          </a:p>
-          <a:p>
-            <a:pPr algn="r" rtl="1"/>
-            <a:r>
-              <a:rPr lang="fa-IR" dirty="0">
-                <a:cs typeface="B Yekan" panose="00000400000000000000" pitchFamily="2" charset="-78"/>
-              </a:rPr>
-              <a:t>کاربردرگیر سیستم عامل نشود</a:t>
-            </a:r>
-          </a:p>
-          <a:p>
-            <a:pPr algn="r" rtl="1"/>
-            <a:endParaRPr lang="en-US" dirty="0">
-              <a:cs typeface="B Yekan" panose="00000400000000000000" pitchFamily="2" charset="-78"/>
-            </a:endParaRPr>
+              <a:t>40 END</a:t>
+            </a:r>
           </a:p>
         </p:txBody>
       </p:sp>
     </p:spTree>
     <p:extLst>
       <p:ext uri="{BB962C8B-B14F-4D97-AF65-F5344CB8AC3E}">
-        <p14:creationId xmlns:p14="http://schemas.microsoft.com/office/powerpoint/2010/main" val="3983776204"/>
+        <p14:creationId xmlns:p14="http://schemas.microsoft.com/office/powerpoint/2010/main" val="2233811051"/>
       </p:ext>
     </p:extLst>
   </p:cSld>
@@ -8764,7 +9034,162 @@
 </p:sld>
 </file>
 
-<file path=ppt/slides/slide19.xml><?xml version="1.0" encoding="utf-8"?>
+<file path=ppt/slides/slide2.xml><?xml version="1.0" encoding="utf-8"?>
+<p:sld xmlns:a="http://schemas.openxmlformats.org/drawingml/2006/main" xmlns:r="http://schemas.openxmlformats.org/officeDocument/2006/relationships" xmlns:p="http://schemas.openxmlformats.org/presentationml/2006/main">
+  <p:cSld>
+    <p:spTree>
+      <p:nvGrpSpPr>
+        <p:cNvPr id="1" name=""/>
+        <p:cNvGrpSpPr/>
+        <p:nvPr/>
+      </p:nvGrpSpPr>
+      <p:grpSpPr>
+        <a:xfrm>
+          <a:off x="0" y="0"/>
+          <a:ext cx="0" cy="0"/>
+          <a:chOff x="0" y="0"/>
+          <a:chExt cx="0" cy="0"/>
+        </a:xfrm>
+      </p:grpSpPr>
+      <p:sp>
+        <p:nvSpPr>
+          <p:cNvPr id="2" name="Title 1">
+            <a:extLst>
+              <a:ext uri="{FF2B5EF4-FFF2-40B4-BE49-F238E27FC236}">
+                <a16:creationId xmlns:a16="http://schemas.microsoft.com/office/drawing/2014/main" id="{856C7422-8099-6D5D-6DE3-FC740C14487C}"/>
+              </a:ext>
+            </a:extLst>
+          </p:cNvPr>
+          <p:cNvSpPr>
+            <a:spLocks noGrp="1"/>
+          </p:cNvSpPr>
+          <p:nvPr>
+            <p:ph type="title"/>
+          </p:nvPr>
+        </p:nvSpPr>
+        <p:spPr/>
+        <p:txBody>
+          <a:bodyPr/>
+          <a:lstStyle/>
+          <a:p>
+            <a:r>
+              <a:rPr lang="fa-IR" dirty="0">
+                <a:cs typeface="B Titr" panose="00000700000000000000" pitchFamily="2" charset="-78"/>
+              </a:rPr>
+              <a:t>محتوای درس </a:t>
+            </a:r>
+            <a:endParaRPr lang="en-US" dirty="0">
+              <a:cs typeface="B Titr" panose="00000700000000000000" pitchFamily="2" charset="-78"/>
+            </a:endParaRPr>
+          </a:p>
+        </p:txBody>
+      </p:sp>
+      <p:sp>
+        <p:nvSpPr>
+          <p:cNvPr id="3" name="Content Placeholder 2">
+            <a:extLst>
+              <a:ext uri="{FF2B5EF4-FFF2-40B4-BE49-F238E27FC236}">
+                <a16:creationId xmlns:a16="http://schemas.microsoft.com/office/drawing/2014/main" id="{C260ECB8-EBE4-5620-E0D7-46882B85EB3C}"/>
+              </a:ext>
+            </a:extLst>
+          </p:cNvPr>
+          <p:cNvSpPr>
+            <a:spLocks noGrp="1"/>
+          </p:cNvSpPr>
+          <p:nvPr>
+            <p:ph idx="1"/>
+          </p:nvPr>
+        </p:nvSpPr>
+        <p:spPr>
+          <a:xfrm>
+            <a:off x="797560" y="2524761"/>
+            <a:ext cx="10820400" cy="2275839"/>
+          </a:xfrm>
+        </p:spPr>
+        <p:txBody>
+          <a:bodyPr>
+            <a:normAutofit/>
+          </a:bodyPr>
+          <a:lstStyle/>
+          <a:p>
+            <a:pPr marL="0" indent="0" algn="ctr" rtl="1">
+              <a:buNone/>
+            </a:pPr>
+            <a:r>
+              <a:rPr lang="en-US" sz="3200" dirty="0">
+                <a:cs typeface="B Yekan" panose="00000400000000000000" pitchFamily="2" charset="-78"/>
+                <a:hlinkClick r:id="rId2"/>
+              </a:rPr>
+              <a:t>https://github.com/aliqasemzadeh/micro</a:t>
+            </a:r>
+            <a:endParaRPr lang="fa-IR" sz="3200" dirty="0">
+              <a:cs typeface="B Yekan" panose="00000400000000000000" pitchFamily="2" charset="-78"/>
+            </a:endParaRPr>
+          </a:p>
+          <a:p>
+            <a:pPr marL="0" indent="0" algn="ctr" rtl="1">
+              <a:buNone/>
+            </a:pPr>
+            <a:endParaRPr lang="fa-IR" sz="3200" dirty="0">
+              <a:cs typeface="B Yekan" panose="00000400000000000000" pitchFamily="2" charset="-78"/>
+            </a:endParaRPr>
+          </a:p>
+          <a:p>
+            <a:pPr marL="0" indent="0" algn="ctr" rtl="1">
+              <a:buNone/>
+            </a:pPr>
+            <a:r>
+              <a:rPr lang="fa-IR" sz="3200" dirty="0">
+                <a:cs typeface="B Yekan" panose="00000400000000000000" pitchFamily="2" charset="-78"/>
+              </a:rPr>
+              <a:t>محتوای درس </a:t>
+            </a:r>
+            <a:r>
+              <a:rPr lang="en-US" sz="3200" dirty="0">
+                <a:cs typeface="B Yekan" panose="00000400000000000000" pitchFamily="2" charset="-78"/>
+              </a:rPr>
+              <a:t>class</a:t>
+            </a:r>
+            <a:endParaRPr lang="fa-IR" sz="3200" dirty="0">
+              <a:cs typeface="B Yekan" panose="00000400000000000000" pitchFamily="2" charset="-78"/>
+            </a:endParaRPr>
+          </a:p>
+          <a:p>
+            <a:pPr marL="0" indent="0" algn="ctr" rtl="1">
+              <a:buNone/>
+            </a:pPr>
+            <a:r>
+              <a:rPr lang="fa-IR" sz="3200" dirty="0">
+                <a:cs typeface="B Yekan" panose="00000400000000000000" pitchFamily="2" charset="-78"/>
+              </a:rPr>
+              <a:t>محتوای کارگاه</a:t>
+            </a:r>
+            <a:r>
+              <a:rPr lang="en-US" sz="3200" dirty="0">
+                <a:cs typeface="B Yekan" panose="00000400000000000000" pitchFamily="2" charset="-78"/>
+              </a:rPr>
+              <a:t> workshop </a:t>
+            </a:r>
+            <a:endParaRPr lang="fa-IR" sz="3200" dirty="0">
+              <a:cs typeface="B Yekan" panose="00000400000000000000" pitchFamily="2" charset="-78"/>
+            </a:endParaRPr>
+          </a:p>
+        </p:txBody>
+      </p:sp>
+    </p:spTree>
+    <p:extLst>
+      <p:ext uri="{BB962C8B-B14F-4D97-AF65-F5344CB8AC3E}">
+        <p14:creationId xmlns:p14="http://schemas.microsoft.com/office/powerpoint/2010/main" val="4074383939"/>
+      </p:ext>
+    </p:extLst>
+  </p:cSld>
+  <p:clrMapOvr>
+    <a:masterClrMapping/>
+  </p:clrMapOvr>
+</p:sld>
+</file>
+
+<file path=ppt/slides/slide20.xml><?xml version="1.0" encoding="utf-8"?>
 <p:sld xmlns:a="http://schemas.openxmlformats.org/drawingml/2006/main" xmlns:r="http://schemas.openxmlformats.org/officeDocument/2006/relationships" xmlns:p="http://schemas.openxmlformats.org/presentationml/2006/main">
   <p:cSld>
     <p:spTree>
@@ -9134,7 +9559,661 @@
 </p:sld>
 </file>
 
-<file path=ppt/slides/slide2.xml><?xml version="1.0" encoding="utf-8"?>
+<file path=ppt/slides/slide21.xml><?xml version="1.0" encoding="utf-8"?>
+<p:sld xmlns:a="http://schemas.openxmlformats.org/drawingml/2006/main" xmlns:r="http://schemas.openxmlformats.org/officeDocument/2006/relationships" xmlns:p="http://schemas.openxmlformats.org/presentationml/2006/main">
+  <p:cSld>
+    <p:spTree>
+      <p:nvGrpSpPr>
+        <p:cNvPr id="1" name=""/>
+        <p:cNvGrpSpPr/>
+        <p:nvPr/>
+      </p:nvGrpSpPr>
+      <p:grpSpPr>
+        <a:xfrm>
+          <a:off x="0" y="0"/>
+          <a:ext cx="0" cy="0"/>
+          <a:chOff x="0" y="0"/>
+          <a:chExt cx="0" cy="0"/>
+        </a:xfrm>
+      </p:grpSpPr>
+      <p:sp>
+        <p:nvSpPr>
+          <p:cNvPr id="2" name="Title 1">
+            <a:extLst>
+              <a:ext uri="{FF2B5EF4-FFF2-40B4-BE49-F238E27FC236}">
+                <a16:creationId xmlns:a16="http://schemas.microsoft.com/office/drawing/2014/main" id="{856C7422-8099-6D5D-6DE3-FC740C14487C}"/>
+              </a:ext>
+            </a:extLst>
+          </p:cNvPr>
+          <p:cNvSpPr>
+            <a:spLocks noGrp="1"/>
+          </p:cNvSpPr>
+          <p:nvPr>
+            <p:ph type="title"/>
+          </p:nvPr>
+        </p:nvSpPr>
+        <p:spPr>
+          <a:xfrm>
+            <a:off x="4338320" y="2782486"/>
+            <a:ext cx="3835400" cy="1293028"/>
+          </a:xfrm>
+        </p:spPr>
+        <p:txBody>
+          <a:bodyPr>
+            <a:normAutofit/>
+          </a:bodyPr>
+          <a:lstStyle/>
+          <a:p>
+            <a:pPr rtl="1"/>
+            <a:r>
+              <a:rPr lang="fa-IR" dirty="0">
+                <a:cs typeface="B Titr" panose="00000700000000000000" pitchFamily="2" charset="-78"/>
+              </a:rPr>
+              <a:t>نمونه برنامه با </a:t>
+            </a:r>
+            <a:r>
+              <a:rPr lang="en-US" dirty="0">
+                <a:cs typeface="B Titr" panose="00000700000000000000" pitchFamily="2" charset="-78"/>
+              </a:rPr>
+              <a:t>C++</a:t>
+            </a:r>
+          </a:p>
+        </p:txBody>
+      </p:sp>
+      <p:sp>
+        <p:nvSpPr>
+          <p:cNvPr id="6" name="Content Placeholder 2">
+            <a:extLst>
+              <a:ext uri="{FF2B5EF4-FFF2-40B4-BE49-F238E27FC236}">
+                <a16:creationId xmlns:a16="http://schemas.microsoft.com/office/drawing/2014/main" id="{D0A38C59-427F-060E-9FF8-B74F3C7FEF08}"/>
+              </a:ext>
+            </a:extLst>
+          </p:cNvPr>
+          <p:cNvSpPr txBox="1">
+            <a:spLocks/>
+          </p:cNvSpPr>
+          <p:nvPr/>
+        </p:nvSpPr>
+        <p:spPr>
+          <a:xfrm>
+            <a:off x="685800" y="2194560"/>
+            <a:ext cx="10820400" cy="4024125"/>
+          </a:xfrm>
+          <a:prstGeom prst="rect">
+            <a:avLst/>
+          </a:prstGeom>
+        </p:spPr>
+        <p:txBody>
+          <a:bodyPr vert="horz" lIns="91440" tIns="45720" rIns="91440" bIns="45720" rtlCol="0">
+            <a:normAutofit/>
+          </a:bodyPr>
+          <a:lstStyle>
+            <a:lvl1pPr marL="228600" indent="-228600" algn="l" defTabSz="914400" rtl="0" eaLnBrk="1" latinLnBrk="0" hangingPunct="1">
+              <a:lnSpc>
+                <a:spcPct val="90000"/>
+              </a:lnSpc>
+              <a:spcBef>
+                <a:spcPts val="1000"/>
+              </a:spcBef>
+              <a:buFont typeface="Arial" panose="020B0604020202020204" pitchFamily="34" charset="0"/>
+              <a:buChar char="•"/>
+              <a:defRPr sz="2200" kern="1200">
+                <a:solidFill>
+                  <a:schemeClr val="tx1"/>
+                </a:solidFill>
+                <a:latin typeface="+mn-lt"/>
+                <a:ea typeface="+mn-ea"/>
+                <a:cs typeface="+mn-cs"/>
+              </a:defRPr>
+            </a:lvl1pPr>
+            <a:lvl2pPr marL="685800" indent="-228600" algn="l" defTabSz="914400" rtl="0" eaLnBrk="1" latinLnBrk="0" hangingPunct="1">
+              <a:lnSpc>
+                <a:spcPct val="90000"/>
+              </a:lnSpc>
+              <a:spcBef>
+                <a:spcPts val="500"/>
+              </a:spcBef>
+              <a:buFont typeface="Arial" panose="020B0604020202020204" pitchFamily="34" charset="0"/>
+              <a:buChar char="•"/>
+              <a:defRPr sz="2000" kern="1200">
+                <a:solidFill>
+                  <a:schemeClr val="tx1"/>
+                </a:solidFill>
+                <a:latin typeface="+mn-lt"/>
+                <a:ea typeface="+mn-ea"/>
+                <a:cs typeface="+mn-cs"/>
+              </a:defRPr>
+            </a:lvl2pPr>
+            <a:lvl3pPr marL="1143000" indent="-228600" algn="l" defTabSz="914400" rtl="0" eaLnBrk="1" latinLnBrk="0" hangingPunct="1">
+              <a:lnSpc>
+                <a:spcPct val="90000"/>
+              </a:lnSpc>
+              <a:spcBef>
+                <a:spcPts val="500"/>
+              </a:spcBef>
+              <a:buFont typeface="Arial" panose="020B0604020202020204" pitchFamily="34" charset="0"/>
+              <a:buChar char="•"/>
+              <a:defRPr sz="1800" kern="1200">
+                <a:solidFill>
+                  <a:schemeClr val="tx1"/>
+                </a:solidFill>
+                <a:latin typeface="+mn-lt"/>
+                <a:ea typeface="+mn-ea"/>
+                <a:cs typeface="+mn-cs"/>
+              </a:defRPr>
+            </a:lvl3pPr>
+            <a:lvl4pPr marL="1600200" indent="-228600" algn="l" defTabSz="914400" rtl="0" eaLnBrk="1" latinLnBrk="0" hangingPunct="1">
+              <a:lnSpc>
+                <a:spcPct val="90000"/>
+              </a:lnSpc>
+              <a:spcBef>
+                <a:spcPts val="500"/>
+              </a:spcBef>
+              <a:buFont typeface="Arial" panose="020B0604020202020204" pitchFamily="34" charset="0"/>
+              <a:buChar char="•"/>
+              <a:defRPr sz="1600" kern="1200">
+                <a:solidFill>
+                  <a:schemeClr val="tx1"/>
+                </a:solidFill>
+                <a:latin typeface="+mn-lt"/>
+                <a:ea typeface="+mn-ea"/>
+                <a:cs typeface="+mn-cs"/>
+              </a:defRPr>
+            </a:lvl4pPr>
+            <a:lvl5pPr marL="2057400" indent="-228600" algn="l" defTabSz="914400" rtl="0" eaLnBrk="1" latinLnBrk="0" hangingPunct="1">
+              <a:lnSpc>
+                <a:spcPct val="90000"/>
+              </a:lnSpc>
+              <a:spcBef>
+                <a:spcPts val="500"/>
+              </a:spcBef>
+              <a:buFont typeface="Arial" panose="020B0604020202020204" pitchFamily="34" charset="0"/>
+              <a:buChar char="•"/>
+              <a:defRPr sz="1600" kern="1200">
+                <a:solidFill>
+                  <a:schemeClr val="tx1"/>
+                </a:solidFill>
+                <a:latin typeface="+mn-lt"/>
+                <a:ea typeface="+mn-ea"/>
+                <a:cs typeface="+mn-cs"/>
+              </a:defRPr>
+            </a:lvl5pPr>
+            <a:lvl6pPr marL="2514600" indent="-228600" algn="l" defTabSz="914400" rtl="0" eaLnBrk="1" latinLnBrk="0" hangingPunct="1">
+              <a:lnSpc>
+                <a:spcPct val="90000"/>
+              </a:lnSpc>
+              <a:spcBef>
+                <a:spcPts val="500"/>
+              </a:spcBef>
+              <a:buFont typeface="Arial" panose="020B0604020202020204" pitchFamily="34" charset="0"/>
+              <a:buChar char="•"/>
+              <a:defRPr sz="1600" kern="1200">
+                <a:solidFill>
+                  <a:schemeClr val="tx1"/>
+                </a:solidFill>
+                <a:latin typeface="+mn-lt"/>
+                <a:ea typeface="+mn-ea"/>
+                <a:cs typeface="+mn-cs"/>
+              </a:defRPr>
+            </a:lvl6pPr>
+            <a:lvl7pPr marL="2971800" indent="-228600" algn="l" defTabSz="914400" rtl="0" eaLnBrk="1" latinLnBrk="0" hangingPunct="1">
+              <a:lnSpc>
+                <a:spcPct val="90000"/>
+              </a:lnSpc>
+              <a:spcBef>
+                <a:spcPts val="500"/>
+              </a:spcBef>
+              <a:buFont typeface="Arial" panose="020B0604020202020204" pitchFamily="34" charset="0"/>
+              <a:buChar char="•"/>
+              <a:defRPr sz="1600" kern="1200">
+                <a:solidFill>
+                  <a:schemeClr val="tx1"/>
+                </a:solidFill>
+                <a:latin typeface="+mn-lt"/>
+                <a:ea typeface="+mn-ea"/>
+                <a:cs typeface="+mn-cs"/>
+              </a:defRPr>
+            </a:lvl7pPr>
+            <a:lvl8pPr marL="3429000" indent="-228600" algn="l" defTabSz="914400" rtl="0" eaLnBrk="1" latinLnBrk="0" hangingPunct="1">
+              <a:lnSpc>
+                <a:spcPct val="90000"/>
+              </a:lnSpc>
+              <a:spcBef>
+                <a:spcPts val="500"/>
+              </a:spcBef>
+              <a:buFont typeface="Arial" panose="020B0604020202020204" pitchFamily="34" charset="0"/>
+              <a:buChar char="•"/>
+              <a:defRPr sz="1600" kern="1200">
+                <a:solidFill>
+                  <a:schemeClr val="tx1"/>
+                </a:solidFill>
+                <a:latin typeface="+mn-lt"/>
+                <a:ea typeface="+mn-ea"/>
+                <a:cs typeface="+mn-cs"/>
+              </a:defRPr>
+            </a:lvl8pPr>
+            <a:lvl9pPr marL="3886200" indent="-228600" algn="l" defTabSz="914400" rtl="0" eaLnBrk="1" latinLnBrk="0" hangingPunct="1">
+              <a:lnSpc>
+                <a:spcPct val="90000"/>
+              </a:lnSpc>
+              <a:spcBef>
+                <a:spcPts val="500"/>
+              </a:spcBef>
+              <a:buFont typeface="Arial" panose="020B0604020202020204" pitchFamily="34" charset="0"/>
+              <a:buChar char="•"/>
+              <a:defRPr sz="1600" kern="1200">
+                <a:solidFill>
+                  <a:schemeClr val="tx1"/>
+                </a:solidFill>
+                <a:latin typeface="+mn-lt"/>
+                <a:ea typeface="+mn-ea"/>
+                <a:cs typeface="+mn-cs"/>
+              </a:defRPr>
+            </a:lvl9pPr>
+          </a:lstStyle>
+          <a:p>
+            <a:pPr algn="r" rtl="1"/>
+            <a:endParaRPr lang="en-US" dirty="0">
+              <a:cs typeface="B Yekan" panose="00000400000000000000" pitchFamily="2" charset="-78"/>
+            </a:endParaRPr>
+          </a:p>
+        </p:txBody>
+      </p:sp>
+    </p:spTree>
+    <p:extLst>
+      <p:ext uri="{BB962C8B-B14F-4D97-AF65-F5344CB8AC3E}">
+        <p14:creationId xmlns:p14="http://schemas.microsoft.com/office/powerpoint/2010/main" val="2368080524"/>
+      </p:ext>
+    </p:extLst>
+  </p:cSld>
+  <p:clrMapOvr>
+    <a:masterClrMapping/>
+  </p:clrMapOvr>
+</p:sld>
+</file>
+
+<file path=ppt/slides/slide22.xml><?xml version="1.0" encoding="utf-8"?>
+<p:sld xmlns:a="http://schemas.openxmlformats.org/drawingml/2006/main" xmlns:r="http://schemas.openxmlformats.org/officeDocument/2006/relationships" xmlns:p="http://schemas.openxmlformats.org/presentationml/2006/main">
+  <p:cSld>
+    <p:spTree>
+      <p:nvGrpSpPr>
+        <p:cNvPr id="1" name=""/>
+        <p:cNvGrpSpPr/>
+        <p:nvPr/>
+      </p:nvGrpSpPr>
+      <p:grpSpPr>
+        <a:xfrm>
+          <a:off x="0" y="0"/>
+          <a:ext cx="0" cy="0"/>
+          <a:chOff x="0" y="0"/>
+          <a:chExt cx="0" cy="0"/>
+        </a:xfrm>
+      </p:grpSpPr>
+      <p:sp>
+        <p:nvSpPr>
+          <p:cNvPr id="4" name="Title 3">
+            <a:extLst>
+              <a:ext uri="{FF2B5EF4-FFF2-40B4-BE49-F238E27FC236}">
+                <a16:creationId xmlns:a16="http://schemas.microsoft.com/office/drawing/2014/main" id="{A16CA5D9-CB63-2799-DAD4-85F1CD9EA811}"/>
+              </a:ext>
+            </a:extLst>
+          </p:cNvPr>
+          <p:cNvSpPr>
+            <a:spLocks noGrp="1"/>
+          </p:cNvSpPr>
+          <p:nvPr>
+            <p:ph type="title"/>
+          </p:nvPr>
+        </p:nvSpPr>
+        <p:spPr>
+          <a:xfrm>
+            <a:off x="286871" y="764373"/>
+            <a:ext cx="11219329" cy="1293028"/>
+          </a:xfrm>
+        </p:spPr>
+        <p:txBody>
+          <a:bodyPr/>
+          <a:lstStyle/>
+          <a:p>
+            <a:pPr algn="ctr" rtl="1"/>
+            <a:r>
+              <a:rPr lang="fa-IR" dirty="0">
+                <a:cs typeface="B Titr" panose="00000700000000000000" pitchFamily="2" charset="-78"/>
+              </a:rPr>
+              <a:t>برنامه نویسی با </a:t>
+            </a:r>
+            <a:r>
+              <a:rPr lang="en-US" dirty="0">
+                <a:cs typeface="B Titr" panose="00000700000000000000" pitchFamily="2" charset="-78"/>
+              </a:rPr>
+              <a:t>Arduino</a:t>
+            </a:r>
+          </a:p>
+        </p:txBody>
+      </p:sp>
+      <p:pic>
+        <p:nvPicPr>
+          <p:cNvPr id="3" name="Picture 2">
+            <a:extLst>
+              <a:ext uri="{FF2B5EF4-FFF2-40B4-BE49-F238E27FC236}">
+                <a16:creationId xmlns:a16="http://schemas.microsoft.com/office/drawing/2014/main" id="{3D0DB4BB-6DAC-4B0A-45AA-AACEEC698765}"/>
+              </a:ext>
+            </a:extLst>
+          </p:cNvPr>
+          <p:cNvPicPr>
+            <a:picLocks noChangeAspect="1"/>
+          </p:cNvPicPr>
+          <p:nvPr/>
+        </p:nvPicPr>
+        <p:blipFill>
+          <a:blip r:embed="rId2"/>
+          <a:stretch>
+            <a:fillRect/>
+          </a:stretch>
+        </p:blipFill>
+        <p:spPr>
+          <a:xfrm>
+            <a:off x="457199" y="3269559"/>
+            <a:ext cx="5397305" cy="2284077"/>
+          </a:xfrm>
+          <a:prstGeom prst="rect">
+            <a:avLst/>
+          </a:prstGeom>
+        </p:spPr>
+      </p:pic>
+      <p:sp>
+        <p:nvSpPr>
+          <p:cNvPr id="2" name="Content Placeholder 2">
+            <a:extLst>
+              <a:ext uri="{FF2B5EF4-FFF2-40B4-BE49-F238E27FC236}">
+                <a16:creationId xmlns:a16="http://schemas.microsoft.com/office/drawing/2014/main" id="{0F816E16-A668-257A-2B2F-C5B1D878860A}"/>
+              </a:ext>
+            </a:extLst>
+          </p:cNvPr>
+          <p:cNvSpPr txBox="1">
+            <a:spLocks/>
+          </p:cNvSpPr>
+          <p:nvPr/>
+        </p:nvSpPr>
+        <p:spPr>
+          <a:xfrm>
+            <a:off x="1053353" y="2203525"/>
+            <a:ext cx="10820400" cy="4024125"/>
+          </a:xfrm>
+          <a:prstGeom prst="rect">
+            <a:avLst/>
+          </a:prstGeom>
+        </p:spPr>
+        <p:txBody>
+          <a:bodyPr vert="horz" lIns="91440" tIns="45720" rIns="91440" bIns="45720" rtlCol="0">
+            <a:normAutofit/>
+          </a:bodyPr>
+          <a:lstStyle>
+            <a:lvl1pPr marL="228600" indent="-228600" algn="l" defTabSz="914400" rtl="0" eaLnBrk="1" latinLnBrk="0" hangingPunct="1">
+              <a:lnSpc>
+                <a:spcPct val="90000"/>
+              </a:lnSpc>
+              <a:spcBef>
+                <a:spcPts val="1000"/>
+              </a:spcBef>
+              <a:buFont typeface="Arial" panose="020B0604020202020204" pitchFamily="34" charset="0"/>
+              <a:buChar char="•"/>
+              <a:defRPr sz="2200" kern="1200">
+                <a:solidFill>
+                  <a:schemeClr val="tx1"/>
+                </a:solidFill>
+                <a:latin typeface="+mn-lt"/>
+                <a:ea typeface="+mn-ea"/>
+                <a:cs typeface="+mn-cs"/>
+              </a:defRPr>
+            </a:lvl1pPr>
+            <a:lvl2pPr marL="685800" indent="-228600" algn="l" defTabSz="914400" rtl="0" eaLnBrk="1" latinLnBrk="0" hangingPunct="1">
+              <a:lnSpc>
+                <a:spcPct val="90000"/>
+              </a:lnSpc>
+              <a:spcBef>
+                <a:spcPts val="500"/>
+              </a:spcBef>
+              <a:buFont typeface="Arial" panose="020B0604020202020204" pitchFamily="34" charset="0"/>
+              <a:buChar char="•"/>
+              <a:defRPr sz="2000" kern="1200">
+                <a:solidFill>
+                  <a:schemeClr val="tx1"/>
+                </a:solidFill>
+                <a:latin typeface="+mn-lt"/>
+                <a:ea typeface="+mn-ea"/>
+                <a:cs typeface="+mn-cs"/>
+              </a:defRPr>
+            </a:lvl2pPr>
+            <a:lvl3pPr marL="1143000" indent="-228600" algn="l" defTabSz="914400" rtl="0" eaLnBrk="1" latinLnBrk="0" hangingPunct="1">
+              <a:lnSpc>
+                <a:spcPct val="90000"/>
+              </a:lnSpc>
+              <a:spcBef>
+                <a:spcPts val="500"/>
+              </a:spcBef>
+              <a:buFont typeface="Arial" panose="020B0604020202020204" pitchFamily="34" charset="0"/>
+              <a:buChar char="•"/>
+              <a:defRPr sz="1800" kern="1200">
+                <a:solidFill>
+                  <a:schemeClr val="tx1"/>
+                </a:solidFill>
+                <a:latin typeface="+mn-lt"/>
+                <a:ea typeface="+mn-ea"/>
+                <a:cs typeface="+mn-cs"/>
+              </a:defRPr>
+            </a:lvl3pPr>
+            <a:lvl4pPr marL="1600200" indent="-228600" algn="l" defTabSz="914400" rtl="0" eaLnBrk="1" latinLnBrk="0" hangingPunct="1">
+              <a:lnSpc>
+                <a:spcPct val="90000"/>
+              </a:lnSpc>
+              <a:spcBef>
+                <a:spcPts val="500"/>
+              </a:spcBef>
+              <a:buFont typeface="Arial" panose="020B0604020202020204" pitchFamily="34" charset="0"/>
+              <a:buChar char="•"/>
+              <a:defRPr sz="1600" kern="1200">
+                <a:solidFill>
+                  <a:schemeClr val="tx1"/>
+                </a:solidFill>
+                <a:latin typeface="+mn-lt"/>
+                <a:ea typeface="+mn-ea"/>
+                <a:cs typeface="+mn-cs"/>
+              </a:defRPr>
+            </a:lvl4pPr>
+            <a:lvl5pPr marL="2057400" indent="-228600" algn="l" defTabSz="914400" rtl="0" eaLnBrk="1" latinLnBrk="0" hangingPunct="1">
+              <a:lnSpc>
+                <a:spcPct val="90000"/>
+              </a:lnSpc>
+              <a:spcBef>
+                <a:spcPts val="500"/>
+              </a:spcBef>
+              <a:buFont typeface="Arial" panose="020B0604020202020204" pitchFamily="34" charset="0"/>
+              <a:buChar char="•"/>
+              <a:defRPr sz="1600" kern="1200">
+                <a:solidFill>
+                  <a:schemeClr val="tx1"/>
+                </a:solidFill>
+                <a:latin typeface="+mn-lt"/>
+                <a:ea typeface="+mn-ea"/>
+                <a:cs typeface="+mn-cs"/>
+              </a:defRPr>
+            </a:lvl5pPr>
+            <a:lvl6pPr marL="2514600" indent="-228600" algn="l" defTabSz="914400" rtl="0" eaLnBrk="1" latinLnBrk="0" hangingPunct="1">
+              <a:lnSpc>
+                <a:spcPct val="90000"/>
+              </a:lnSpc>
+              <a:spcBef>
+                <a:spcPts val="500"/>
+              </a:spcBef>
+              <a:buFont typeface="Arial" panose="020B0604020202020204" pitchFamily="34" charset="0"/>
+              <a:buChar char="•"/>
+              <a:defRPr sz="1600" kern="1200">
+                <a:solidFill>
+                  <a:schemeClr val="tx1"/>
+                </a:solidFill>
+                <a:latin typeface="+mn-lt"/>
+                <a:ea typeface="+mn-ea"/>
+                <a:cs typeface="+mn-cs"/>
+              </a:defRPr>
+            </a:lvl6pPr>
+            <a:lvl7pPr marL="2971800" indent="-228600" algn="l" defTabSz="914400" rtl="0" eaLnBrk="1" latinLnBrk="0" hangingPunct="1">
+              <a:lnSpc>
+                <a:spcPct val="90000"/>
+              </a:lnSpc>
+              <a:spcBef>
+                <a:spcPts val="500"/>
+              </a:spcBef>
+              <a:buFont typeface="Arial" panose="020B0604020202020204" pitchFamily="34" charset="0"/>
+              <a:buChar char="•"/>
+              <a:defRPr sz="1600" kern="1200">
+                <a:solidFill>
+                  <a:schemeClr val="tx1"/>
+                </a:solidFill>
+                <a:latin typeface="+mn-lt"/>
+                <a:ea typeface="+mn-ea"/>
+                <a:cs typeface="+mn-cs"/>
+              </a:defRPr>
+            </a:lvl7pPr>
+            <a:lvl8pPr marL="3429000" indent="-228600" algn="l" defTabSz="914400" rtl="0" eaLnBrk="1" latinLnBrk="0" hangingPunct="1">
+              <a:lnSpc>
+                <a:spcPct val="90000"/>
+              </a:lnSpc>
+              <a:spcBef>
+                <a:spcPts val="500"/>
+              </a:spcBef>
+              <a:buFont typeface="Arial" panose="020B0604020202020204" pitchFamily="34" charset="0"/>
+              <a:buChar char="•"/>
+              <a:defRPr sz="1600" kern="1200">
+                <a:solidFill>
+                  <a:schemeClr val="tx1"/>
+                </a:solidFill>
+                <a:latin typeface="+mn-lt"/>
+                <a:ea typeface="+mn-ea"/>
+                <a:cs typeface="+mn-cs"/>
+              </a:defRPr>
+            </a:lvl8pPr>
+            <a:lvl9pPr marL="3886200" indent="-228600" algn="l" defTabSz="914400" rtl="0" eaLnBrk="1" latinLnBrk="0" hangingPunct="1">
+              <a:lnSpc>
+                <a:spcPct val="90000"/>
+              </a:lnSpc>
+              <a:spcBef>
+                <a:spcPts val="500"/>
+              </a:spcBef>
+              <a:buFont typeface="Arial" panose="020B0604020202020204" pitchFamily="34" charset="0"/>
+              <a:buChar char="•"/>
+              <a:defRPr sz="1600" kern="1200">
+                <a:solidFill>
+                  <a:schemeClr val="tx1"/>
+                </a:solidFill>
+                <a:latin typeface="+mn-lt"/>
+                <a:ea typeface="+mn-ea"/>
+                <a:cs typeface="+mn-cs"/>
+              </a:defRPr>
+            </a:lvl9pPr>
+          </a:lstStyle>
+          <a:p>
+            <a:pPr algn="r" rtl="1"/>
+            <a:r>
+              <a:rPr lang="en-US" dirty="0">
+                <a:cs typeface="B Yekan" panose="00000400000000000000" pitchFamily="2" charset="-78"/>
+              </a:rPr>
+              <a:t>High Level </a:t>
+            </a:r>
+          </a:p>
+          <a:p>
+            <a:pPr algn="r" rtl="1"/>
+            <a:r>
+              <a:rPr lang="fa-IR" dirty="0">
+                <a:cs typeface="B Yekan" panose="00000400000000000000" pitchFamily="2" charset="-78"/>
+              </a:rPr>
+              <a:t>بر پایه </a:t>
+            </a:r>
+            <a:r>
+              <a:rPr lang="en-US" dirty="0">
+                <a:cs typeface="B Yekan" panose="00000400000000000000" pitchFamily="2" charset="-78"/>
+              </a:rPr>
+              <a:t>C</a:t>
+            </a:r>
+            <a:r>
+              <a:rPr lang="fa-IR" dirty="0">
+                <a:cs typeface="B Yekan" panose="00000400000000000000" pitchFamily="2" charset="-78"/>
+              </a:rPr>
+              <a:t> نوشته شده است.</a:t>
+            </a:r>
+          </a:p>
+          <a:p>
+            <a:pPr algn="r" rtl="1"/>
+            <a:r>
+              <a:rPr lang="fa-IR" dirty="0">
+                <a:cs typeface="B Yekan" panose="00000400000000000000" pitchFamily="2" charset="-78"/>
+              </a:rPr>
+              <a:t>با کمک توابع پیش تعریف بسیاری از </a:t>
+            </a:r>
+          </a:p>
+          <a:p>
+            <a:pPr marL="0" indent="0" algn="r" rtl="1">
+              <a:buNone/>
+            </a:pPr>
+            <a:r>
+              <a:rPr lang="fa-IR" dirty="0">
+                <a:cs typeface="B Yekan" panose="00000400000000000000" pitchFamily="2" charset="-78"/>
+              </a:rPr>
+              <a:t>امور را انجام می دهد.</a:t>
+            </a:r>
+          </a:p>
+          <a:p>
+            <a:pPr algn="r" rtl="1"/>
+            <a:r>
+              <a:rPr lang="fa-IR" dirty="0">
+                <a:cs typeface="B Yekan" panose="00000400000000000000" pitchFamily="2" charset="-78"/>
+              </a:rPr>
+              <a:t>نیاز به یادگیری زبان برنامه نویسی سخت نیست.</a:t>
+            </a:r>
+          </a:p>
+          <a:p>
+            <a:pPr algn="r" rtl="1"/>
+            <a:r>
+              <a:rPr lang="fa-IR" dirty="0">
+                <a:cs typeface="B Yekan" panose="00000400000000000000" pitchFamily="2" charset="-78"/>
+              </a:rPr>
+              <a:t>سطح بالاست و درگیری شما با سخت افزار کم است</a:t>
+            </a:r>
+          </a:p>
+          <a:p>
+            <a:pPr algn="r" rtl="1"/>
+            <a:r>
+              <a:rPr lang="fa-IR">
+                <a:cs typeface="B Yekan" panose="00000400000000000000" pitchFamily="2" charset="-78"/>
+              </a:rPr>
+              <a:t>مثال های بسیار متنوع دارد.</a:t>
+            </a:r>
+            <a:endParaRPr lang="fa-IR" dirty="0">
+              <a:cs typeface="B Yekan" panose="00000400000000000000" pitchFamily="2" charset="-78"/>
+            </a:endParaRPr>
+          </a:p>
+          <a:p>
+            <a:pPr algn="r" rtl="1"/>
+            <a:endParaRPr lang="en-US" dirty="0">
+              <a:cs typeface="B Yekan" panose="00000400000000000000" pitchFamily="2" charset="-78"/>
+            </a:endParaRPr>
+          </a:p>
+        </p:txBody>
+      </p:sp>
+    </p:spTree>
+    <p:extLst>
+      <p:ext uri="{BB962C8B-B14F-4D97-AF65-F5344CB8AC3E}">
+        <p14:creationId xmlns:p14="http://schemas.microsoft.com/office/powerpoint/2010/main" val="2688988768"/>
+      </p:ext>
+    </p:extLst>
+  </p:cSld>
+  <p:clrMapOvr>
+    <a:masterClrMapping/>
+  </p:clrMapOvr>
+</p:sld>
+</file>
+
+<file path=ppt/slides/slide3.xml><?xml version="1.0" encoding="utf-8"?>
 <p:sld xmlns:a="http://schemas.openxmlformats.org/drawingml/2006/main" xmlns:r="http://schemas.openxmlformats.org/officeDocument/2006/relationships" xmlns:p="http://schemas.openxmlformats.org/presentationml/2006/main">
   <p:cSld>
     <p:spTree>
@@ -9288,7 +10367,7 @@
     </p:spTree>
     <p:extLst>
       <p:ext uri="{BB962C8B-B14F-4D97-AF65-F5344CB8AC3E}">
-        <p14:creationId xmlns:p14="http://schemas.microsoft.com/office/powerpoint/2010/main" val="4074383939"/>
+        <p14:creationId xmlns:p14="http://schemas.microsoft.com/office/powerpoint/2010/main" val="3238894862"/>
       </p:ext>
     </p:extLst>
   </p:cSld>
@@ -9298,388 +10377,7 @@
 </p:sld>
 </file>
 
-<file path=ppt/slides/slide20.xml><?xml version="1.0" encoding="utf-8"?>
-<p:sld xmlns:a="http://schemas.openxmlformats.org/drawingml/2006/main" xmlns:r="http://schemas.openxmlformats.org/officeDocument/2006/relationships" xmlns:p="http://schemas.openxmlformats.org/presentationml/2006/main">
-  <p:cSld>
-    <p:spTree>
-      <p:nvGrpSpPr>
-        <p:cNvPr id="1" name=""/>
-        <p:cNvGrpSpPr/>
-        <p:nvPr/>
-      </p:nvGrpSpPr>
-      <p:grpSpPr>
-        <a:xfrm>
-          <a:off x="0" y="0"/>
-          <a:ext cx="0" cy="0"/>
-          <a:chOff x="0" y="0"/>
-          <a:chExt cx="0" cy="0"/>
-        </a:xfrm>
-      </p:grpSpPr>
-      <p:sp>
-        <p:nvSpPr>
-          <p:cNvPr id="4" name="Title 3">
-            <a:extLst>
-              <a:ext uri="{FF2B5EF4-FFF2-40B4-BE49-F238E27FC236}">
-                <a16:creationId xmlns:a16="http://schemas.microsoft.com/office/drawing/2014/main" id="{A16CA5D9-CB63-2799-DAD4-85F1CD9EA811}"/>
-              </a:ext>
-            </a:extLst>
-          </p:cNvPr>
-          <p:cNvSpPr>
-            <a:spLocks noGrp="1"/>
-          </p:cNvSpPr>
-          <p:nvPr>
-            <p:ph type="title"/>
-          </p:nvPr>
-        </p:nvSpPr>
-        <p:spPr>
-          <a:xfrm>
-            <a:off x="286871" y="764373"/>
-            <a:ext cx="11219329" cy="1293028"/>
-          </a:xfrm>
-        </p:spPr>
-        <p:txBody>
-          <a:bodyPr/>
-          <a:lstStyle/>
-          <a:p>
-            <a:pPr algn="ctr" rtl="1"/>
-            <a:r>
-              <a:rPr lang="fa-IR" dirty="0">
-                <a:cs typeface="B Titr" panose="00000700000000000000" pitchFamily="2" charset="-78"/>
-              </a:rPr>
-              <a:t>برنامه نویسی با </a:t>
-            </a:r>
-            <a:r>
-              <a:rPr lang="en-US" dirty="0">
-                <a:cs typeface="B Titr" panose="00000700000000000000" pitchFamily="2" charset="-78"/>
-              </a:rPr>
-              <a:t>Arduino</a:t>
-            </a:r>
-          </a:p>
-        </p:txBody>
-      </p:sp>
-      <p:pic>
-        <p:nvPicPr>
-          <p:cNvPr id="3" name="Picture 2">
-            <a:extLst>
-              <a:ext uri="{FF2B5EF4-FFF2-40B4-BE49-F238E27FC236}">
-                <a16:creationId xmlns:a16="http://schemas.microsoft.com/office/drawing/2014/main" id="{3D0DB4BB-6DAC-4B0A-45AA-AACEEC698765}"/>
-              </a:ext>
-            </a:extLst>
-          </p:cNvPr>
-          <p:cNvPicPr>
-            <a:picLocks noChangeAspect="1"/>
-          </p:cNvPicPr>
-          <p:nvPr/>
-        </p:nvPicPr>
-        <p:blipFill>
-          <a:blip r:embed="rId2"/>
-          <a:stretch>
-            <a:fillRect/>
-          </a:stretch>
-        </p:blipFill>
-        <p:spPr>
-          <a:xfrm>
-            <a:off x="457199" y="3269559"/>
-            <a:ext cx="5397305" cy="2284077"/>
-          </a:xfrm>
-          <a:prstGeom prst="rect">
-            <a:avLst/>
-          </a:prstGeom>
-        </p:spPr>
-      </p:pic>
-      <p:sp>
-        <p:nvSpPr>
-          <p:cNvPr id="2" name="Content Placeholder 2">
-            <a:extLst>
-              <a:ext uri="{FF2B5EF4-FFF2-40B4-BE49-F238E27FC236}">
-                <a16:creationId xmlns:a16="http://schemas.microsoft.com/office/drawing/2014/main" id="{0F816E16-A668-257A-2B2F-C5B1D878860A}"/>
-              </a:ext>
-            </a:extLst>
-          </p:cNvPr>
-          <p:cNvSpPr txBox="1">
-            <a:spLocks/>
-          </p:cNvSpPr>
-          <p:nvPr/>
-        </p:nvSpPr>
-        <p:spPr>
-          <a:xfrm>
-            <a:off x="1053353" y="2203525"/>
-            <a:ext cx="10820400" cy="4024125"/>
-          </a:xfrm>
-          <a:prstGeom prst="rect">
-            <a:avLst/>
-          </a:prstGeom>
-        </p:spPr>
-        <p:txBody>
-          <a:bodyPr vert="horz" lIns="91440" tIns="45720" rIns="91440" bIns="45720" rtlCol="0">
-            <a:normAutofit/>
-          </a:bodyPr>
-          <a:lstStyle>
-            <a:lvl1pPr marL="228600" indent="-228600" algn="l" defTabSz="914400" rtl="0" eaLnBrk="1" latinLnBrk="0" hangingPunct="1">
-              <a:lnSpc>
-                <a:spcPct val="90000"/>
-              </a:lnSpc>
-              <a:spcBef>
-                <a:spcPts val="1000"/>
-              </a:spcBef>
-              <a:buFont typeface="Arial" panose="020B0604020202020204" pitchFamily="34" charset="0"/>
-              <a:buChar char="•"/>
-              <a:defRPr sz="2200" kern="1200">
-                <a:solidFill>
-                  <a:schemeClr val="tx1"/>
-                </a:solidFill>
-                <a:latin typeface="+mn-lt"/>
-                <a:ea typeface="+mn-ea"/>
-                <a:cs typeface="+mn-cs"/>
-              </a:defRPr>
-            </a:lvl1pPr>
-            <a:lvl2pPr marL="685800" indent="-228600" algn="l" defTabSz="914400" rtl="0" eaLnBrk="1" latinLnBrk="0" hangingPunct="1">
-              <a:lnSpc>
-                <a:spcPct val="90000"/>
-              </a:lnSpc>
-              <a:spcBef>
-                <a:spcPts val="500"/>
-              </a:spcBef>
-              <a:buFont typeface="Arial" panose="020B0604020202020204" pitchFamily="34" charset="0"/>
-              <a:buChar char="•"/>
-              <a:defRPr sz="2000" kern="1200">
-                <a:solidFill>
-                  <a:schemeClr val="tx1"/>
-                </a:solidFill>
-                <a:latin typeface="+mn-lt"/>
-                <a:ea typeface="+mn-ea"/>
-                <a:cs typeface="+mn-cs"/>
-              </a:defRPr>
-            </a:lvl2pPr>
-            <a:lvl3pPr marL="1143000" indent="-228600" algn="l" defTabSz="914400" rtl="0" eaLnBrk="1" latinLnBrk="0" hangingPunct="1">
-              <a:lnSpc>
-                <a:spcPct val="90000"/>
-              </a:lnSpc>
-              <a:spcBef>
-                <a:spcPts val="500"/>
-              </a:spcBef>
-              <a:buFont typeface="Arial" panose="020B0604020202020204" pitchFamily="34" charset="0"/>
-              <a:buChar char="•"/>
-              <a:defRPr sz="1800" kern="1200">
-                <a:solidFill>
-                  <a:schemeClr val="tx1"/>
-                </a:solidFill>
-                <a:latin typeface="+mn-lt"/>
-                <a:ea typeface="+mn-ea"/>
-                <a:cs typeface="+mn-cs"/>
-              </a:defRPr>
-            </a:lvl3pPr>
-            <a:lvl4pPr marL="1600200" indent="-228600" algn="l" defTabSz="914400" rtl="0" eaLnBrk="1" latinLnBrk="0" hangingPunct="1">
-              <a:lnSpc>
-                <a:spcPct val="90000"/>
-              </a:lnSpc>
-              <a:spcBef>
-                <a:spcPts val="500"/>
-              </a:spcBef>
-              <a:buFont typeface="Arial" panose="020B0604020202020204" pitchFamily="34" charset="0"/>
-              <a:buChar char="•"/>
-              <a:defRPr sz="1600" kern="1200">
-                <a:solidFill>
-                  <a:schemeClr val="tx1"/>
-                </a:solidFill>
-                <a:latin typeface="+mn-lt"/>
-                <a:ea typeface="+mn-ea"/>
-                <a:cs typeface="+mn-cs"/>
-              </a:defRPr>
-            </a:lvl4pPr>
-            <a:lvl5pPr marL="2057400" indent="-228600" algn="l" defTabSz="914400" rtl="0" eaLnBrk="1" latinLnBrk="0" hangingPunct="1">
-              <a:lnSpc>
-                <a:spcPct val="90000"/>
-              </a:lnSpc>
-              <a:spcBef>
-                <a:spcPts val="500"/>
-              </a:spcBef>
-              <a:buFont typeface="Arial" panose="020B0604020202020204" pitchFamily="34" charset="0"/>
-              <a:buChar char="•"/>
-              <a:defRPr sz="1600" kern="1200">
-                <a:solidFill>
-                  <a:schemeClr val="tx1"/>
-                </a:solidFill>
-                <a:latin typeface="+mn-lt"/>
-                <a:ea typeface="+mn-ea"/>
-                <a:cs typeface="+mn-cs"/>
-              </a:defRPr>
-            </a:lvl5pPr>
-            <a:lvl6pPr marL="2514600" indent="-228600" algn="l" defTabSz="914400" rtl="0" eaLnBrk="1" latinLnBrk="0" hangingPunct="1">
-              <a:lnSpc>
-                <a:spcPct val="90000"/>
-              </a:lnSpc>
-              <a:spcBef>
-                <a:spcPts val="500"/>
-              </a:spcBef>
-              <a:buFont typeface="Arial" panose="020B0604020202020204" pitchFamily="34" charset="0"/>
-              <a:buChar char="•"/>
-              <a:defRPr sz="1600" kern="1200">
-                <a:solidFill>
-                  <a:schemeClr val="tx1"/>
-                </a:solidFill>
-                <a:latin typeface="+mn-lt"/>
-                <a:ea typeface="+mn-ea"/>
-                <a:cs typeface="+mn-cs"/>
-              </a:defRPr>
-            </a:lvl6pPr>
-            <a:lvl7pPr marL="2971800" indent="-228600" algn="l" defTabSz="914400" rtl="0" eaLnBrk="1" latinLnBrk="0" hangingPunct="1">
-              <a:lnSpc>
-                <a:spcPct val="90000"/>
-              </a:lnSpc>
-              <a:spcBef>
-                <a:spcPts val="500"/>
-              </a:spcBef>
-              <a:buFont typeface="Arial" panose="020B0604020202020204" pitchFamily="34" charset="0"/>
-              <a:buChar char="•"/>
-              <a:defRPr sz="1600" kern="1200">
-                <a:solidFill>
-                  <a:schemeClr val="tx1"/>
-                </a:solidFill>
-                <a:latin typeface="+mn-lt"/>
-                <a:ea typeface="+mn-ea"/>
-                <a:cs typeface="+mn-cs"/>
-              </a:defRPr>
-            </a:lvl7pPr>
-            <a:lvl8pPr marL="3429000" indent="-228600" algn="l" defTabSz="914400" rtl="0" eaLnBrk="1" latinLnBrk="0" hangingPunct="1">
-              <a:lnSpc>
-                <a:spcPct val="90000"/>
-              </a:lnSpc>
-              <a:spcBef>
-                <a:spcPts val="500"/>
-              </a:spcBef>
-              <a:buFont typeface="Arial" panose="020B0604020202020204" pitchFamily="34" charset="0"/>
-              <a:buChar char="•"/>
-              <a:defRPr sz="1600" kern="1200">
-                <a:solidFill>
-                  <a:schemeClr val="tx1"/>
-                </a:solidFill>
-                <a:latin typeface="+mn-lt"/>
-                <a:ea typeface="+mn-ea"/>
-                <a:cs typeface="+mn-cs"/>
-              </a:defRPr>
-            </a:lvl8pPr>
-            <a:lvl9pPr marL="3886200" indent="-228600" algn="l" defTabSz="914400" rtl="0" eaLnBrk="1" latinLnBrk="0" hangingPunct="1">
-              <a:lnSpc>
-                <a:spcPct val="90000"/>
-              </a:lnSpc>
-              <a:spcBef>
-                <a:spcPts val="500"/>
-              </a:spcBef>
-              <a:buFont typeface="Arial" panose="020B0604020202020204" pitchFamily="34" charset="0"/>
-              <a:buChar char="•"/>
-              <a:defRPr sz="1600" kern="1200">
-                <a:solidFill>
-                  <a:schemeClr val="tx1"/>
-                </a:solidFill>
-                <a:latin typeface="+mn-lt"/>
-                <a:ea typeface="+mn-ea"/>
-                <a:cs typeface="+mn-cs"/>
-              </a:defRPr>
-            </a:lvl9pPr>
-          </a:lstStyle>
-          <a:p>
-            <a:pPr algn="r" rtl="1"/>
-            <a:r>
-              <a:rPr lang="en-US" dirty="0">
-                <a:cs typeface="B Yekan" panose="00000400000000000000" pitchFamily="2" charset="-78"/>
-              </a:rPr>
-              <a:t>High Level </a:t>
-            </a:r>
-          </a:p>
-          <a:p>
-            <a:pPr algn="r" rtl="1"/>
-            <a:r>
-              <a:rPr lang="fa-IR" dirty="0">
-                <a:cs typeface="B Yekan" panose="00000400000000000000" pitchFamily="2" charset="-78"/>
-              </a:rPr>
-              <a:t>بر پایه </a:t>
-            </a:r>
-            <a:r>
-              <a:rPr lang="en-US" dirty="0">
-                <a:cs typeface="B Yekan" panose="00000400000000000000" pitchFamily="2" charset="-78"/>
-              </a:rPr>
-              <a:t>C</a:t>
-            </a:r>
-            <a:r>
-              <a:rPr lang="fa-IR" dirty="0">
-                <a:cs typeface="B Yekan" panose="00000400000000000000" pitchFamily="2" charset="-78"/>
-              </a:rPr>
-              <a:t> نوشته شده است.</a:t>
-            </a:r>
-          </a:p>
-          <a:p>
-            <a:pPr algn="r" rtl="1"/>
-            <a:r>
-              <a:rPr lang="fa-IR" dirty="0">
-                <a:cs typeface="B Yekan" panose="00000400000000000000" pitchFamily="2" charset="-78"/>
-              </a:rPr>
-              <a:t>با کمک توابع پیش تعریف بسیاری از </a:t>
-            </a:r>
-          </a:p>
-          <a:p>
-            <a:pPr marL="0" indent="0" algn="r" rtl="1">
-              <a:buNone/>
-            </a:pPr>
-            <a:r>
-              <a:rPr lang="fa-IR" dirty="0">
-                <a:cs typeface="B Yekan" panose="00000400000000000000" pitchFamily="2" charset="-78"/>
-              </a:rPr>
-              <a:t>امور را انجام می دهد.</a:t>
-            </a:r>
-          </a:p>
-          <a:p>
-            <a:pPr algn="r" rtl="1"/>
-            <a:r>
-              <a:rPr lang="fa-IR" dirty="0">
-                <a:cs typeface="B Yekan" panose="00000400000000000000" pitchFamily="2" charset="-78"/>
-              </a:rPr>
-              <a:t>نیاز به یادگیری زبان برنامه نویسی سخت نیست.</a:t>
-            </a:r>
-          </a:p>
-          <a:p>
-            <a:pPr algn="r" rtl="1"/>
-            <a:r>
-              <a:rPr lang="fa-IR" dirty="0">
-                <a:cs typeface="B Yekan" panose="00000400000000000000" pitchFamily="2" charset="-78"/>
-              </a:rPr>
-              <a:t>سطح بالاست و درگیری شما با سخت افزار کم است</a:t>
-            </a:r>
-          </a:p>
-          <a:p>
-            <a:pPr algn="r" rtl="1"/>
-            <a:r>
-              <a:rPr lang="fa-IR">
-                <a:cs typeface="B Yekan" panose="00000400000000000000" pitchFamily="2" charset="-78"/>
-              </a:rPr>
-              <a:t>مثال های بسیار متنوع دارد.</a:t>
-            </a:r>
-            <a:endParaRPr lang="fa-IR" dirty="0">
-              <a:cs typeface="B Yekan" panose="00000400000000000000" pitchFamily="2" charset="-78"/>
-            </a:endParaRPr>
-          </a:p>
-          <a:p>
-            <a:pPr algn="r" rtl="1"/>
-            <a:endParaRPr lang="en-US" dirty="0">
-              <a:cs typeface="B Yekan" panose="00000400000000000000" pitchFamily="2" charset="-78"/>
-            </a:endParaRPr>
-          </a:p>
-        </p:txBody>
-      </p:sp>
-    </p:spTree>
-    <p:extLst>
-      <p:ext uri="{BB962C8B-B14F-4D97-AF65-F5344CB8AC3E}">
-        <p14:creationId xmlns:p14="http://schemas.microsoft.com/office/powerpoint/2010/main" val="2688988768"/>
-      </p:ext>
-    </p:extLst>
-  </p:cSld>
-  <p:clrMapOvr>
-    <a:masterClrMapping/>
-  </p:clrMapOvr>
-</p:sld>
-</file>
-
-<file path=ppt/slides/slide3.xml><?xml version="1.0" encoding="utf-8"?>
+<file path=ppt/slides/slide4.xml><?xml version="1.0" encoding="utf-8"?>
 <p:sld xmlns:a="http://schemas.openxmlformats.org/drawingml/2006/main" xmlns:r="http://schemas.openxmlformats.org/officeDocument/2006/relationships" xmlns:p="http://schemas.openxmlformats.org/presentationml/2006/main">
   <p:cSld>
     <p:spTree>
@@ -9834,7 +10532,7 @@
 </p:sld>
 </file>
 
-<file path=ppt/slides/slide4.xml><?xml version="1.0" encoding="utf-8"?>
+<file path=ppt/slides/slide5.xml><?xml version="1.0" encoding="utf-8"?>
 <p:sld xmlns:a="http://schemas.openxmlformats.org/drawingml/2006/main" xmlns:r="http://schemas.openxmlformats.org/officeDocument/2006/relationships" xmlns:p="http://schemas.openxmlformats.org/presentationml/2006/main">
   <p:cSld>
     <p:spTree>
@@ -9943,7 +10641,7 @@
 </p:sld>
 </file>
 
-<file path=ppt/slides/slide5.xml><?xml version="1.0" encoding="utf-8"?>
+<file path=ppt/slides/slide6.xml><?xml version="1.0" encoding="utf-8"?>
 <p:sld xmlns:a="http://schemas.openxmlformats.org/drawingml/2006/main" xmlns:r="http://schemas.openxmlformats.org/officeDocument/2006/relationships" xmlns:p="http://schemas.openxmlformats.org/presentationml/2006/main">
   <p:cSld>
     <p:spTree>
@@ -11114,7 +11812,7 @@
 </p:sld>
 </file>
 
-<file path=ppt/slides/slide6.xml><?xml version="1.0" encoding="utf-8"?>
+<file path=ppt/slides/slide7.xml><?xml version="1.0" encoding="utf-8"?>
 <p:sld xmlns:a="http://schemas.openxmlformats.org/drawingml/2006/main" xmlns:r="http://schemas.openxmlformats.org/officeDocument/2006/relationships" xmlns:p="http://schemas.openxmlformats.org/presentationml/2006/main">
   <p:cSld>
     <p:spTree>
@@ -11314,7 +12012,7 @@
 </p:sld>
 </file>
 
-<file path=ppt/slides/slide7.xml><?xml version="1.0" encoding="utf-8"?>
+<file path=ppt/slides/slide8.xml><?xml version="1.0" encoding="utf-8"?>
 <p:sld xmlns:a="http://schemas.openxmlformats.org/drawingml/2006/main" xmlns:r="http://schemas.openxmlformats.org/officeDocument/2006/relationships" xmlns:p="http://schemas.openxmlformats.org/presentationml/2006/main">
   <p:cSld>
     <p:spTree>
@@ -11515,154 +12213,6 @@
 </p:sld>
 </file>
 
-<file path=ppt/slides/slide8.xml><?xml version="1.0" encoding="utf-8"?>
-<p:sld xmlns:a="http://schemas.openxmlformats.org/drawingml/2006/main" xmlns:r="http://schemas.openxmlformats.org/officeDocument/2006/relationships" xmlns:p="http://schemas.openxmlformats.org/presentationml/2006/main">
-  <p:cSld>
-    <p:spTree>
-      <p:nvGrpSpPr>
-        <p:cNvPr id="1" name=""/>
-        <p:cNvGrpSpPr/>
-        <p:nvPr/>
-      </p:nvGrpSpPr>
-      <p:grpSpPr>
-        <a:xfrm>
-          <a:off x="0" y="0"/>
-          <a:ext cx="0" cy="0"/>
-          <a:chOff x="0" y="0"/>
-          <a:chExt cx="0" cy="0"/>
-        </a:xfrm>
-      </p:grpSpPr>
-      <p:sp>
-        <p:nvSpPr>
-          <p:cNvPr id="2" name="Title 1">
-            <a:extLst>
-              <a:ext uri="{FF2B5EF4-FFF2-40B4-BE49-F238E27FC236}">
-                <a16:creationId xmlns:a16="http://schemas.microsoft.com/office/drawing/2014/main" id="{856C7422-8099-6D5D-6DE3-FC740C14487C}"/>
-              </a:ext>
-            </a:extLst>
-          </p:cNvPr>
-          <p:cNvSpPr>
-            <a:spLocks noGrp="1"/>
-          </p:cNvSpPr>
-          <p:nvPr>
-            <p:ph type="title"/>
-          </p:nvPr>
-        </p:nvSpPr>
-        <p:spPr/>
-        <p:txBody>
-          <a:bodyPr/>
-          <a:lstStyle/>
-          <a:p>
-            <a:r>
-              <a:rPr lang="fa-IR" dirty="0">
-                <a:cs typeface="B Titr" panose="00000700000000000000" pitchFamily="2" charset="-78"/>
-              </a:rPr>
-              <a:t>گذرگاه های ارتباطی</a:t>
-            </a:r>
-            <a:endParaRPr lang="en-US" dirty="0">
-              <a:cs typeface="B Titr" panose="00000700000000000000" pitchFamily="2" charset="-78"/>
-            </a:endParaRPr>
-          </a:p>
-        </p:txBody>
-      </p:sp>
-      <p:sp>
-        <p:nvSpPr>
-          <p:cNvPr id="3" name="Content Placeholder 2">
-            <a:extLst>
-              <a:ext uri="{FF2B5EF4-FFF2-40B4-BE49-F238E27FC236}">
-                <a16:creationId xmlns:a16="http://schemas.microsoft.com/office/drawing/2014/main" id="{C260ECB8-EBE4-5620-E0D7-46882B85EB3C}"/>
-              </a:ext>
-            </a:extLst>
-          </p:cNvPr>
-          <p:cNvSpPr>
-            <a:spLocks noGrp="1"/>
-          </p:cNvSpPr>
-          <p:nvPr>
-            <p:ph idx="1"/>
-          </p:nvPr>
-        </p:nvSpPr>
-        <p:spPr/>
-        <p:txBody>
-          <a:bodyPr/>
-          <a:lstStyle/>
-          <a:p>
-            <a:pPr algn="r" rtl="1"/>
-            <a:r>
-              <a:rPr lang="en-US" dirty="0">
-                <a:cs typeface="B Yekan" panose="00000400000000000000" pitchFamily="2" charset="-78"/>
-              </a:rPr>
-              <a:t>UART</a:t>
-            </a:r>
-            <a:endParaRPr lang="fa-IR" dirty="0">
-              <a:cs typeface="B Yekan" panose="00000400000000000000" pitchFamily="2" charset="-78"/>
-            </a:endParaRPr>
-          </a:p>
-          <a:p>
-            <a:pPr algn="r" rtl="1"/>
-            <a:r>
-              <a:rPr lang="en-US" dirty="0">
-                <a:cs typeface="B Yekan" panose="00000400000000000000" pitchFamily="2" charset="-78"/>
-              </a:rPr>
-              <a:t>SPI</a:t>
-            </a:r>
-          </a:p>
-          <a:p>
-            <a:pPr algn="r" rtl="1"/>
-            <a:r>
-              <a:rPr lang="en-US" dirty="0">
-                <a:cs typeface="B Yekan" panose="00000400000000000000" pitchFamily="2" charset="-78"/>
-              </a:rPr>
-              <a:t>USB</a:t>
-            </a:r>
-          </a:p>
-          <a:p>
-            <a:pPr algn="r" rtl="1"/>
-            <a:r>
-              <a:rPr lang="en-US" dirty="0">
-                <a:cs typeface="B Yekan" panose="00000400000000000000" pitchFamily="2" charset="-78"/>
-              </a:rPr>
-              <a:t>Ethernet</a:t>
-            </a:r>
-          </a:p>
-          <a:p>
-            <a:pPr algn="r" rtl="1"/>
-            <a:r>
-              <a:rPr lang="en-US" dirty="0" err="1">
-                <a:cs typeface="B Yekan" panose="00000400000000000000" pitchFamily="2" charset="-78"/>
-              </a:rPr>
-              <a:t>Xbee</a:t>
-            </a:r>
-            <a:endParaRPr lang="en-US" dirty="0">
-              <a:cs typeface="B Yekan" panose="00000400000000000000" pitchFamily="2" charset="-78"/>
-            </a:endParaRPr>
-          </a:p>
-          <a:p>
-            <a:pPr algn="r" rtl="1"/>
-            <a:endParaRPr lang="en-US" dirty="0">
-              <a:cs typeface="B Yekan" panose="00000400000000000000" pitchFamily="2" charset="-78"/>
-            </a:endParaRPr>
-          </a:p>
-          <a:p>
-            <a:pPr algn="r" rtl="1"/>
-            <a:endParaRPr lang="en-US" dirty="0">
-              <a:cs typeface="B Yekan" panose="00000400000000000000" pitchFamily="2" charset="-78"/>
-            </a:endParaRPr>
-          </a:p>
-        </p:txBody>
-      </p:sp>
-    </p:spTree>
-    <p:extLst>
-      <p:ext uri="{BB962C8B-B14F-4D97-AF65-F5344CB8AC3E}">
-        <p14:creationId xmlns:p14="http://schemas.microsoft.com/office/powerpoint/2010/main" val="3111007454"/>
-      </p:ext>
-    </p:extLst>
-  </p:cSld>
-  <p:clrMapOvr>
-    <a:masterClrMapping/>
-  </p:clrMapOvr>
-</p:sld>
-</file>
-
 <file path=ppt/slides/slide9.xml><?xml version="1.0" encoding="utf-8"?>
 <p:sld xmlns:a="http://schemas.openxmlformats.org/drawingml/2006/main" xmlns:r="http://schemas.openxmlformats.org/officeDocument/2006/relationships" xmlns:p="http://schemas.openxmlformats.org/presentationml/2006/main">
   <p:cSld>
@@ -11702,242 +12252,48 @@
           <a:lstStyle/>
           <a:p>
             <a:r>
-              <a:rPr lang="en-US" dirty="0">
+              <a:rPr lang="fa-IR" dirty="0">
                 <a:cs typeface="B Titr" panose="00000700000000000000" pitchFamily="2" charset="-78"/>
               </a:rPr>
-              <a:t>Universal Asynchronous Receiver / Transmitter</a:t>
-            </a:r>
-          </a:p>
-        </p:txBody>
-      </p:sp>
-      <p:pic>
-        <p:nvPicPr>
-          <p:cNvPr id="5" name="Content Placeholder 4">
+              <a:t>گذرگاه های ارتباطی</a:t>
+            </a:r>
+            <a:endParaRPr lang="en-US" dirty="0">
+              <a:cs typeface="B Titr" panose="00000700000000000000" pitchFamily="2" charset="-78"/>
+            </a:endParaRPr>
+          </a:p>
+        </p:txBody>
+      </p:sp>
+      <p:sp>
+        <p:nvSpPr>
+          <p:cNvPr id="3" name="Content Placeholder 2">
             <a:extLst>
               <a:ext uri="{FF2B5EF4-FFF2-40B4-BE49-F238E27FC236}">
-                <a16:creationId xmlns:a16="http://schemas.microsoft.com/office/drawing/2014/main" id="{76A2BC28-FDE9-9B61-EB77-4B39D5A14B7F}"/>
+                <a16:creationId xmlns:a16="http://schemas.microsoft.com/office/drawing/2014/main" id="{C260ECB8-EBE4-5620-E0D7-46882B85EB3C}"/>
               </a:ext>
             </a:extLst>
           </p:cNvPr>
-          <p:cNvPicPr>
-            <a:picLocks noGrp="1" noChangeAspect="1"/>
-          </p:cNvPicPr>
+          <p:cNvSpPr>
+            <a:spLocks noGrp="1"/>
+          </p:cNvSpPr>
           <p:nvPr>
             <p:ph idx="1"/>
           </p:nvPr>
-        </p:nvPicPr>
-        <p:blipFill>
-          <a:blip r:embed="rId2"/>
-          <a:stretch>
-            <a:fillRect/>
-          </a:stretch>
-        </p:blipFill>
-        <p:spPr>
-          <a:xfrm>
-            <a:off x="-62753" y="2894993"/>
-            <a:ext cx="6096000" cy="3429000"/>
-          </a:xfrm>
-        </p:spPr>
-      </p:pic>
-      <p:sp>
-        <p:nvSpPr>
-          <p:cNvPr id="6" name="Content Placeholder 2">
-            <a:extLst>
-              <a:ext uri="{FF2B5EF4-FFF2-40B4-BE49-F238E27FC236}">
-                <a16:creationId xmlns:a16="http://schemas.microsoft.com/office/drawing/2014/main" id="{24E3D5CD-64F9-862A-E710-6B80AB70EA48}"/>
-              </a:ext>
-            </a:extLst>
-          </p:cNvPr>
-          <p:cNvSpPr txBox="1">
-            <a:spLocks/>
-          </p:cNvSpPr>
-          <p:nvPr/>
-        </p:nvSpPr>
-        <p:spPr>
-          <a:xfrm>
-            <a:off x="685800" y="2194560"/>
-            <a:ext cx="10820400" cy="4024125"/>
-          </a:xfrm>
-          <a:prstGeom prst="rect">
-            <a:avLst/>
-          </a:prstGeom>
-        </p:spPr>
-        <p:txBody>
-          <a:bodyPr vert="horz" lIns="91440" tIns="45720" rIns="91440" bIns="45720" rtlCol="0">
-            <a:normAutofit/>
-          </a:bodyPr>
-          <a:lstStyle>
-            <a:lvl1pPr marL="228600" indent="-228600" algn="l" defTabSz="914400" rtl="0" eaLnBrk="1" latinLnBrk="0" hangingPunct="1">
-              <a:lnSpc>
-                <a:spcPct val="90000"/>
-              </a:lnSpc>
-              <a:spcBef>
-                <a:spcPts val="1000"/>
-              </a:spcBef>
-              <a:buFont typeface="Arial" panose="020B0604020202020204" pitchFamily="34" charset="0"/>
-              <a:buChar char="•"/>
-              <a:defRPr sz="2200" kern="1200">
-                <a:solidFill>
-                  <a:schemeClr val="tx1"/>
-                </a:solidFill>
-                <a:latin typeface="+mn-lt"/>
-                <a:ea typeface="+mn-ea"/>
-                <a:cs typeface="+mn-cs"/>
-              </a:defRPr>
-            </a:lvl1pPr>
-            <a:lvl2pPr marL="685800" indent="-228600" algn="l" defTabSz="914400" rtl="0" eaLnBrk="1" latinLnBrk="0" hangingPunct="1">
-              <a:lnSpc>
-                <a:spcPct val="90000"/>
-              </a:lnSpc>
-              <a:spcBef>
-                <a:spcPts val="500"/>
-              </a:spcBef>
-              <a:buFont typeface="Arial" panose="020B0604020202020204" pitchFamily="34" charset="0"/>
-              <a:buChar char="•"/>
-              <a:defRPr sz="2000" kern="1200">
-                <a:solidFill>
-                  <a:schemeClr val="tx1"/>
-                </a:solidFill>
-                <a:latin typeface="+mn-lt"/>
-                <a:ea typeface="+mn-ea"/>
-                <a:cs typeface="+mn-cs"/>
-              </a:defRPr>
-            </a:lvl2pPr>
-            <a:lvl3pPr marL="1143000" indent="-228600" algn="l" defTabSz="914400" rtl="0" eaLnBrk="1" latinLnBrk="0" hangingPunct="1">
-              <a:lnSpc>
-                <a:spcPct val="90000"/>
-              </a:lnSpc>
-              <a:spcBef>
-                <a:spcPts val="500"/>
-              </a:spcBef>
-              <a:buFont typeface="Arial" panose="020B0604020202020204" pitchFamily="34" charset="0"/>
-              <a:buChar char="•"/>
-              <a:defRPr sz="1800" kern="1200">
-                <a:solidFill>
-                  <a:schemeClr val="tx1"/>
-                </a:solidFill>
-                <a:latin typeface="+mn-lt"/>
-                <a:ea typeface="+mn-ea"/>
-                <a:cs typeface="+mn-cs"/>
-              </a:defRPr>
-            </a:lvl3pPr>
-            <a:lvl4pPr marL="1600200" indent="-228600" algn="l" defTabSz="914400" rtl="0" eaLnBrk="1" latinLnBrk="0" hangingPunct="1">
-              <a:lnSpc>
-                <a:spcPct val="90000"/>
-              </a:lnSpc>
-              <a:spcBef>
-                <a:spcPts val="500"/>
-              </a:spcBef>
-              <a:buFont typeface="Arial" panose="020B0604020202020204" pitchFamily="34" charset="0"/>
-              <a:buChar char="•"/>
-              <a:defRPr sz="1600" kern="1200">
-                <a:solidFill>
-                  <a:schemeClr val="tx1"/>
-                </a:solidFill>
-                <a:latin typeface="+mn-lt"/>
-                <a:ea typeface="+mn-ea"/>
-                <a:cs typeface="+mn-cs"/>
-              </a:defRPr>
-            </a:lvl4pPr>
-            <a:lvl5pPr marL="2057400" indent="-228600" algn="l" defTabSz="914400" rtl="0" eaLnBrk="1" latinLnBrk="0" hangingPunct="1">
-              <a:lnSpc>
-                <a:spcPct val="90000"/>
-              </a:lnSpc>
-              <a:spcBef>
-                <a:spcPts val="500"/>
-              </a:spcBef>
-              <a:buFont typeface="Arial" panose="020B0604020202020204" pitchFamily="34" charset="0"/>
-              <a:buChar char="•"/>
-              <a:defRPr sz="1600" kern="1200">
-                <a:solidFill>
-                  <a:schemeClr val="tx1"/>
-                </a:solidFill>
-                <a:latin typeface="+mn-lt"/>
-                <a:ea typeface="+mn-ea"/>
-                <a:cs typeface="+mn-cs"/>
-              </a:defRPr>
-            </a:lvl5pPr>
-            <a:lvl6pPr marL="2514600" indent="-228600" algn="l" defTabSz="914400" rtl="0" eaLnBrk="1" latinLnBrk="0" hangingPunct="1">
-              <a:lnSpc>
-                <a:spcPct val="90000"/>
-              </a:lnSpc>
-              <a:spcBef>
-                <a:spcPts val="500"/>
-              </a:spcBef>
-              <a:buFont typeface="Arial" panose="020B0604020202020204" pitchFamily="34" charset="0"/>
-              <a:buChar char="•"/>
-              <a:defRPr sz="1600" kern="1200">
-                <a:solidFill>
-                  <a:schemeClr val="tx1"/>
-                </a:solidFill>
-                <a:latin typeface="+mn-lt"/>
-                <a:ea typeface="+mn-ea"/>
-                <a:cs typeface="+mn-cs"/>
-              </a:defRPr>
-            </a:lvl6pPr>
-            <a:lvl7pPr marL="2971800" indent="-228600" algn="l" defTabSz="914400" rtl="0" eaLnBrk="1" latinLnBrk="0" hangingPunct="1">
-              <a:lnSpc>
-                <a:spcPct val="90000"/>
-              </a:lnSpc>
-              <a:spcBef>
-                <a:spcPts val="500"/>
-              </a:spcBef>
-              <a:buFont typeface="Arial" panose="020B0604020202020204" pitchFamily="34" charset="0"/>
-              <a:buChar char="•"/>
-              <a:defRPr sz="1600" kern="1200">
-                <a:solidFill>
-                  <a:schemeClr val="tx1"/>
-                </a:solidFill>
-                <a:latin typeface="+mn-lt"/>
-                <a:ea typeface="+mn-ea"/>
-                <a:cs typeface="+mn-cs"/>
-              </a:defRPr>
-            </a:lvl7pPr>
-            <a:lvl8pPr marL="3429000" indent="-228600" algn="l" defTabSz="914400" rtl="0" eaLnBrk="1" latinLnBrk="0" hangingPunct="1">
-              <a:lnSpc>
-                <a:spcPct val="90000"/>
-              </a:lnSpc>
-              <a:spcBef>
-                <a:spcPts val="500"/>
-              </a:spcBef>
-              <a:buFont typeface="Arial" panose="020B0604020202020204" pitchFamily="34" charset="0"/>
-              <a:buChar char="•"/>
-              <a:defRPr sz="1600" kern="1200">
-                <a:solidFill>
-                  <a:schemeClr val="tx1"/>
-                </a:solidFill>
-                <a:latin typeface="+mn-lt"/>
-                <a:ea typeface="+mn-ea"/>
-                <a:cs typeface="+mn-cs"/>
-              </a:defRPr>
-            </a:lvl8pPr>
-            <a:lvl9pPr marL="3886200" indent="-228600" algn="l" defTabSz="914400" rtl="0" eaLnBrk="1" latinLnBrk="0" hangingPunct="1">
-              <a:lnSpc>
-                <a:spcPct val="90000"/>
-              </a:lnSpc>
-              <a:spcBef>
-                <a:spcPts val="500"/>
-              </a:spcBef>
-              <a:buFont typeface="Arial" panose="020B0604020202020204" pitchFamily="34" charset="0"/>
-              <a:buChar char="•"/>
-              <a:defRPr sz="1600" kern="1200">
-                <a:solidFill>
-                  <a:schemeClr val="tx1"/>
-                </a:solidFill>
-                <a:latin typeface="+mn-lt"/>
-                <a:ea typeface="+mn-ea"/>
-                <a:cs typeface="+mn-cs"/>
-              </a:defRPr>
-            </a:lvl9pPr>
-          </a:lstStyle>
+        </p:nvSpPr>
+        <p:spPr/>
+        <p:txBody>
+          <a:bodyPr/>
+          <a:lstStyle/>
           <a:p>
             <a:pPr algn="r" rtl="1"/>
             <a:r>
               <a:rPr lang="en-US" dirty="0">
                 <a:cs typeface="B Yekan" panose="00000400000000000000" pitchFamily="2" charset="-78"/>
               </a:rPr>
-              <a:t>RS232</a:t>
-            </a:r>
+              <a:t>UART</a:t>
+            </a:r>
+            <a:endParaRPr lang="fa-IR" dirty="0">
+              <a:cs typeface="B Yekan" panose="00000400000000000000" pitchFamily="2" charset="-78"/>
+            </a:endParaRPr>
           </a:p>
           <a:p>
             <a:pPr algn="r" rtl="1"/>
@@ -11945,15 +12301,38 @@
               <a:rPr lang="en-US" dirty="0">
                 <a:cs typeface="B Yekan" panose="00000400000000000000" pitchFamily="2" charset="-78"/>
               </a:rPr>
-              <a:t>Baud Rate:</a:t>
-            </a:r>
-            <a:r>
-              <a:rPr lang="en-US" b="0" i="0" dirty="0">
-                <a:effectLst/>
-                <a:latin typeface="Linotype Univers"/>
-              </a:rPr>
-              <a:t>4800, 9600, 19.2K, 57.6K,115.2K</a:t>
-            </a:r>
+              <a:t>SPI</a:t>
+            </a:r>
+          </a:p>
+          <a:p>
+            <a:pPr algn="r" rtl="1"/>
+            <a:r>
+              <a:rPr lang="en-US" dirty="0">
+                <a:cs typeface="B Yekan" panose="00000400000000000000" pitchFamily="2" charset="-78"/>
+              </a:rPr>
+              <a:t>USB</a:t>
+            </a:r>
+          </a:p>
+          <a:p>
+            <a:pPr algn="r" rtl="1"/>
+            <a:r>
+              <a:rPr lang="en-US" dirty="0">
+                <a:cs typeface="B Yekan" panose="00000400000000000000" pitchFamily="2" charset="-78"/>
+              </a:rPr>
+              <a:t>Ethernet</a:t>
+            </a:r>
+          </a:p>
+          <a:p>
+            <a:pPr algn="r" rtl="1"/>
+            <a:r>
+              <a:rPr lang="en-US" dirty="0" err="1">
+                <a:cs typeface="B Yekan" panose="00000400000000000000" pitchFamily="2" charset="-78"/>
+              </a:rPr>
+              <a:t>Xbee</a:t>
+            </a:r>
+            <a:endParaRPr lang="en-US" dirty="0">
+              <a:cs typeface="B Yekan" panose="00000400000000000000" pitchFamily="2" charset="-78"/>
+            </a:endParaRPr>
           </a:p>
           <a:p>
             <a:pPr algn="r" rtl="1"/>
@@ -11972,7 +12351,7 @@
     </p:spTree>
     <p:extLst>
       <p:ext uri="{BB962C8B-B14F-4D97-AF65-F5344CB8AC3E}">
-        <p14:creationId xmlns:p14="http://schemas.microsoft.com/office/powerpoint/2010/main" val="96513302"/>
+        <p14:creationId xmlns:p14="http://schemas.microsoft.com/office/powerpoint/2010/main" val="3111007454"/>
       </p:ext>
     </p:extLst>
   </p:cSld>

</xml_diff>

<commit_message>
add libs for arduino.
</commit_message>
<xml_diff>
--- a/class/micro02.pptx
+++ b/class/micro02.pptx
@@ -7960,7 +7960,7 @@
               <a:rPr lang="en-US" dirty="0">
                 <a:cs typeface="B Yekan" panose="00000400000000000000" pitchFamily="2" charset="-78"/>
               </a:rPr>
-              <a:t>000100110010</a:t>
+              <a:t>000100100010</a:t>
             </a:r>
             <a:r>
               <a:rPr lang="fa-IR" dirty="0">
@@ -9118,7 +9118,13 @@
             <a:r>
               <a:rPr lang="en-US" sz="3200" dirty="0">
                 <a:cs typeface="B Yekan" panose="00000400000000000000" pitchFamily="2" charset="-78"/>
-                <a:hlinkClick r:id="rId2"/>
+                <a:hlinkClick r:id="rId2">
+                  <a:extLst>
+                    <a:ext uri="{A12FA001-AC4F-418D-AE19-62706E023703}">
+                      <ahyp:hlinkClr xmlns:ahyp="http://schemas.microsoft.com/office/drawing/2018/hyperlinkcolor" val="tx"/>
+                    </a:ext>
+                  </a:extLst>
+                </a:hlinkClick>
               </a:rPr>
               <a:t>https://github.com/aliqasemzadeh/micro</a:t>
             </a:r>

</xml_diff>